<commit_message>
Added changes to presentation.
</commit_message>
<xml_diff>
--- a/ООПp.2.pptx
+++ b/ООПp.2.pptx
@@ -12068,11 +12068,7 @@
             <a:pPr marL="342900" indent="-342900"/>
             <a:r>
               <a:rPr lang="ru-RU" dirty="0" smtClean="0"/>
-              <a:t>этих </a:t>
-            </a:r>
-            <a:r>
-              <a:rPr lang="ru-RU" dirty="0" smtClean="0"/>
-              <a:t>методов</a:t>
+              <a:t>этих методов</a:t>
             </a:r>
             <a:r>
               <a:rPr lang="en-US" dirty="0" smtClean="0"/>
@@ -12314,13 +12310,8 @@
           <a:p>
             <a:r>
               <a:rPr lang="ru-RU" sz="1200" b="1" dirty="0" smtClean="0"/>
-              <a:t>Преимущества </a:t>
-            </a:r>
-            <a:r>
-              <a:rPr lang="ru-RU" sz="1200" b="1" dirty="0" smtClean="0"/>
-              <a:t>абстракции</a:t>
-            </a:r>
-            <a:endParaRPr lang="ru-RU" sz="1200" b="1" dirty="0" smtClean="0"/>
+              <a:t>Преимущества абстракции</a:t>
+            </a:r>
           </a:p>
           <a:p>
             <a:r>
@@ -12335,19 +12326,11 @@
           <a:p>
             <a:r>
               <a:rPr lang="ru-RU" sz="1200" b="1" dirty="0" smtClean="0"/>
-              <a:t>Повышение удобства поддержки кода</a:t>
-            </a:r>
-            <a:r>
-              <a:rPr lang="ru-RU" sz="1200" b="1" dirty="0" smtClean="0"/>
-              <a:t>.</a:t>
+              <a:t>Повышение удобства поддержки кода.</a:t>
             </a:r>
             <a:r>
               <a:rPr lang="ru-RU" sz="1200" dirty="0" smtClean="0"/>
-              <a:t> </a:t>
-            </a:r>
-            <a:r>
-              <a:rPr lang="ru-RU" sz="1200" dirty="0" smtClean="0"/>
-              <a:t>Как пример</a:t>
+              <a:t> Как пример</a:t>
             </a:r>
             <a:r>
               <a:rPr lang="en-US" sz="1200" dirty="0" smtClean="0"/>
@@ -12355,15 +12338,7 @@
             </a:r>
             <a:r>
               <a:rPr lang="ru-RU" sz="1200" dirty="0" smtClean="0"/>
-              <a:t>и</a:t>
-            </a:r>
-            <a:r>
-              <a:rPr lang="ru-RU" sz="1200" dirty="0" smtClean="0"/>
-              <a:t>зменение </a:t>
-            </a:r>
-            <a:r>
-              <a:rPr lang="ru-RU" sz="1200" dirty="0" smtClean="0"/>
-              <a:t>внутренней логики не затрагивает пользовательский интерфейс.</a:t>
+              <a:t>изменение внутренней логики не затрагивает пользовательский интерфейс.</a:t>
             </a:r>
           </a:p>
           <a:p>
@@ -12373,13 +12348,8 @@
             </a:r>
             <a:r>
               <a:rPr lang="ru-RU" sz="1200" dirty="0" smtClean="0"/>
-              <a:t> Абстракция задаёт единый интерфейс для работы с объектами разных типов, обеспечивая их взаимозаменяемость</a:t>
-            </a:r>
-            <a:r>
-              <a:rPr lang="ru-RU" sz="1200" dirty="0" smtClean="0"/>
-              <a:t>.</a:t>
-            </a:r>
-            <a:endParaRPr lang="ru-RU" sz="1200" dirty="0" smtClean="0"/>
+              <a:t> Абстракция задаёт единый интерфейс для работы с объектами разных типов, обеспечивая их взаимозаменяемость.</a:t>
+            </a:r>
           </a:p>
         </p:txBody>
       </p:sp>
@@ -12392,7 +12362,7 @@
         <p:spPr>
           <a:xfrm>
             <a:off x="5302293" y="1365975"/>
-            <a:ext cx="3332343" cy="1754326"/>
+            <a:ext cx="3332343" cy="1615827"/>
           </a:xfrm>
           <a:prstGeom prst="rect">
             <a:avLst/>
@@ -12405,7 +12375,7 @@
           <a:lstStyle/>
           <a:p>
             <a:r>
-              <a:rPr lang="en-US" sz="1200" b="1" dirty="0">
+              <a:rPr lang="en-US" sz="1100" b="1" dirty="0">
                 <a:solidFill>
                   <a:srgbClr val="FF0000"/>
                 </a:solidFill>
@@ -12414,7 +12384,7 @@
               <a:t>abstract class </a:t>
             </a:r>
             <a:r>
-              <a:rPr lang="en-US" sz="1200" dirty="0" err="1">
+              <a:rPr lang="en-US" sz="1100" dirty="0" err="1">
                 <a:solidFill>
                   <a:srgbClr val="267F99"/>
                 </a:solidFill>
@@ -12422,13 +12392,13 @@
               </a:rPr>
               <a:t>AbstractAnimal</a:t>
             </a:r>
-            <a:endParaRPr lang="en-US" sz="1200" dirty="0">
+            <a:endParaRPr lang="en-US" sz="1100" dirty="0">
               <a:latin typeface="Consolas" panose="020B0609020204030204" pitchFamily="49" charset="0"/>
             </a:endParaRPr>
           </a:p>
           <a:p>
             <a:r>
-              <a:rPr lang="en-US" sz="1200" dirty="0">
+              <a:rPr lang="en-US" sz="1100" dirty="0">
                 <a:latin typeface="Consolas" panose="020B0609020204030204" pitchFamily="49" charset="0"/>
               </a:rPr>
               <a:t>{</a:t>
@@ -12436,13 +12406,13 @@
           </a:p>
           <a:p>
             <a:r>
-              <a:rPr lang="en-US" sz="1200" dirty="0">
+              <a:rPr lang="en-US" sz="1100" dirty="0">
                 <a:latin typeface="Consolas" panose="020B0609020204030204" pitchFamily="49" charset="0"/>
               </a:rPr>
               <a:t>    </a:t>
             </a:r>
             <a:r>
-              <a:rPr lang="en-US" sz="1200" dirty="0">
+              <a:rPr lang="en-US" sz="1100" dirty="0">
                 <a:solidFill>
                   <a:srgbClr val="0000FF"/>
                 </a:solidFill>
@@ -12451,13 +12421,13 @@
               <a:t>public</a:t>
             </a:r>
             <a:r>
-              <a:rPr lang="en-US" sz="1200" dirty="0">
+              <a:rPr lang="en-US" sz="1100" dirty="0">
                 <a:latin typeface="Consolas" panose="020B0609020204030204" pitchFamily="49" charset="0"/>
               </a:rPr>
               <a:t> </a:t>
             </a:r>
             <a:r>
-              <a:rPr lang="en-US" sz="1200" dirty="0">
+              <a:rPr lang="en-US" sz="1100" dirty="0">
                 <a:solidFill>
                   <a:srgbClr val="0000FF"/>
                 </a:solidFill>
@@ -12466,13 +12436,13 @@
               <a:t>abstract</a:t>
             </a:r>
             <a:r>
-              <a:rPr lang="en-US" sz="1200" dirty="0">
+              <a:rPr lang="en-US" sz="1100" dirty="0">
                 <a:latin typeface="Consolas" panose="020B0609020204030204" pitchFamily="49" charset="0"/>
               </a:rPr>
               <a:t> </a:t>
             </a:r>
             <a:r>
-              <a:rPr lang="en-US" sz="1200" dirty="0">
+              <a:rPr lang="en-US" sz="1100" dirty="0">
                 <a:solidFill>
                   <a:srgbClr val="0000FF"/>
                 </a:solidFill>
@@ -12481,13 +12451,13 @@
               <a:t>void</a:t>
             </a:r>
             <a:r>
-              <a:rPr lang="en-US" sz="1200" dirty="0">
+              <a:rPr lang="en-US" sz="1100" dirty="0">
                 <a:latin typeface="Consolas" panose="020B0609020204030204" pitchFamily="49" charset="0"/>
               </a:rPr>
               <a:t> </a:t>
             </a:r>
             <a:r>
-              <a:rPr lang="en-US" sz="1200" dirty="0">
+              <a:rPr lang="en-US" sz="1100" dirty="0">
                 <a:solidFill>
                   <a:srgbClr val="795E26"/>
                 </a:solidFill>
@@ -12496,7 +12466,7 @@
               <a:t>Eat</a:t>
             </a:r>
             <a:r>
-              <a:rPr lang="en-US" sz="1200" dirty="0">
+              <a:rPr lang="en-US" sz="1100" dirty="0">
                 <a:latin typeface="Consolas" panose="020B0609020204030204" pitchFamily="49" charset="0"/>
               </a:rPr>
               <a:t>();</a:t>
@@ -12504,7 +12474,7 @@
           </a:p>
           <a:p>
             <a:r>
-              <a:rPr lang="en-US" sz="1200" dirty="0">
+              <a:rPr lang="en-US" sz="1100" dirty="0">
                 <a:latin typeface="Consolas" panose="020B0609020204030204" pitchFamily="49" charset="0"/>
               </a:rPr>
               <a:t>}</a:t>
@@ -12512,18 +12482,18 @@
           </a:p>
           <a:p>
             <a:r>
-              <a:rPr lang="en-US" sz="1200" dirty="0">
+              <a:rPr lang="en-US" sz="1100" dirty="0">
                 <a:latin typeface="Consolas" panose="020B0609020204030204" pitchFamily="49" charset="0"/>
               </a:rPr>
               <a:t/>
             </a:r>
             <a:br>
-              <a:rPr lang="en-US" sz="1200" dirty="0">
+              <a:rPr lang="en-US" sz="1100" dirty="0">
                 <a:latin typeface="Consolas" panose="020B0609020204030204" pitchFamily="49" charset="0"/>
               </a:rPr>
             </a:br>
             <a:r>
-              <a:rPr lang="en-US" sz="1200" b="1" dirty="0">
+              <a:rPr lang="en-US" sz="1100" b="1" dirty="0">
                 <a:solidFill>
                   <a:srgbClr val="FF0000"/>
                 </a:solidFill>
@@ -12532,13 +12502,13 @@
               <a:t>interface</a:t>
             </a:r>
             <a:r>
-              <a:rPr lang="en-US" sz="1200" dirty="0">
+              <a:rPr lang="en-US" sz="1100" dirty="0">
                 <a:latin typeface="Consolas" panose="020B0609020204030204" pitchFamily="49" charset="0"/>
               </a:rPr>
               <a:t> </a:t>
             </a:r>
             <a:r>
-              <a:rPr lang="en-US" sz="1200" dirty="0" err="1">
+              <a:rPr lang="en-US" sz="1100" dirty="0" err="1">
                 <a:solidFill>
                   <a:srgbClr val="267F99"/>
                 </a:solidFill>
@@ -12546,13 +12516,13 @@
               </a:rPr>
               <a:t>IAnimal</a:t>
             </a:r>
-            <a:endParaRPr lang="en-US" sz="1200" dirty="0">
+            <a:endParaRPr lang="en-US" sz="1100" dirty="0">
               <a:latin typeface="Consolas" panose="020B0609020204030204" pitchFamily="49" charset="0"/>
             </a:endParaRPr>
           </a:p>
           <a:p>
             <a:r>
-              <a:rPr lang="en-US" sz="1200" dirty="0">
+              <a:rPr lang="en-US" sz="1100" dirty="0">
                 <a:latin typeface="Consolas" panose="020B0609020204030204" pitchFamily="49" charset="0"/>
               </a:rPr>
               <a:t>{</a:t>
@@ -12560,13 +12530,13 @@
           </a:p>
           <a:p>
             <a:r>
-              <a:rPr lang="en-US" sz="1200" dirty="0">
+              <a:rPr lang="en-US" sz="1100" dirty="0">
                 <a:latin typeface="Consolas" panose="020B0609020204030204" pitchFamily="49" charset="0"/>
               </a:rPr>
               <a:t>    </a:t>
             </a:r>
             <a:r>
-              <a:rPr lang="en-US" sz="1200" dirty="0">
+              <a:rPr lang="en-US" sz="1100" dirty="0">
                 <a:solidFill>
                   <a:srgbClr val="0000FF"/>
                 </a:solidFill>
@@ -12575,13 +12545,13 @@
               <a:t>void</a:t>
             </a:r>
             <a:r>
-              <a:rPr lang="en-US" sz="1200" dirty="0">
+              <a:rPr lang="en-US" sz="1100" dirty="0">
                 <a:latin typeface="Consolas" panose="020B0609020204030204" pitchFamily="49" charset="0"/>
               </a:rPr>
               <a:t> </a:t>
             </a:r>
             <a:r>
-              <a:rPr lang="en-US" sz="1200" dirty="0" err="1">
+              <a:rPr lang="en-US" sz="1100" dirty="0" err="1">
                 <a:solidFill>
                   <a:srgbClr val="795E26"/>
                 </a:solidFill>
@@ -12590,7 +12560,7 @@
               <a:t>MakeSound</a:t>
             </a:r>
             <a:r>
-              <a:rPr lang="en-US" sz="1200" dirty="0">
+              <a:rPr lang="en-US" sz="1100" dirty="0">
                 <a:latin typeface="Consolas" panose="020B0609020204030204" pitchFamily="49" charset="0"/>
               </a:rPr>
               <a:t>();</a:t>
@@ -12598,7 +12568,7 @@
           </a:p>
           <a:p>
             <a:r>
-              <a:rPr lang="en-US" sz="1200" dirty="0">
+              <a:rPr lang="en-US" sz="1100" dirty="0">
                 <a:latin typeface="Consolas" panose="020B0609020204030204" pitchFamily="49" charset="0"/>
               </a:rPr>
               <a:t>}</a:t>
@@ -12755,7 +12725,7 @@
         <p:spPr>
           <a:xfrm>
             <a:off x="4351072" y="1172991"/>
-            <a:ext cx="4504494" cy="3231654"/>
+            <a:ext cx="4504494" cy="2970044"/>
           </a:xfrm>
           <a:prstGeom prst="rect">
             <a:avLst/>
@@ -12768,7 +12738,7 @@
           <a:lstStyle/>
           <a:p>
             <a:r>
-              <a:rPr lang="en-US" sz="1200" b="1" dirty="0" smtClean="0">
+              <a:rPr lang="en-US" sz="1100" b="1" dirty="0" smtClean="0">
                 <a:solidFill>
                   <a:srgbClr val="FF0000"/>
                 </a:solidFill>
@@ -12777,13 +12747,13 @@
               <a:t>interface</a:t>
             </a:r>
             <a:r>
-              <a:rPr lang="en-US" sz="1200" dirty="0" smtClean="0">
+              <a:rPr lang="en-US" sz="1100" dirty="0" smtClean="0">
                 <a:latin typeface="Consolas"/>
               </a:rPr>
               <a:t> </a:t>
             </a:r>
             <a:r>
-              <a:rPr lang="en-US" sz="1200" dirty="0" err="1" smtClean="0">
+              <a:rPr lang="en-US" sz="1100" dirty="0" err="1" smtClean="0">
                 <a:solidFill>
                   <a:srgbClr val="267F99"/>
                 </a:solidFill>
@@ -12791,13 +12761,13 @@
               </a:rPr>
               <a:t>ISoldier</a:t>
             </a:r>
-            <a:endParaRPr lang="en-US" sz="1200" dirty="0" smtClean="0">
+            <a:endParaRPr lang="en-US" sz="1100" dirty="0" smtClean="0">
               <a:latin typeface="Consolas"/>
             </a:endParaRPr>
           </a:p>
           <a:p>
             <a:r>
-              <a:rPr lang="en-US" sz="1200" dirty="0" smtClean="0">
+              <a:rPr lang="en-US" sz="1100" dirty="0" smtClean="0">
                 <a:latin typeface="Consolas"/>
               </a:rPr>
               <a:t>{</a:t>
@@ -12805,13 +12775,13 @@
           </a:p>
           <a:p>
             <a:r>
-              <a:rPr lang="en-US" sz="1200" dirty="0" smtClean="0">
+              <a:rPr lang="en-US" sz="1100" dirty="0" smtClean="0">
                 <a:latin typeface="Consolas"/>
               </a:rPr>
               <a:t>    </a:t>
             </a:r>
             <a:r>
-              <a:rPr lang="en-US" sz="1200" dirty="0" smtClean="0">
+              <a:rPr lang="en-US" sz="1100" dirty="0" smtClean="0">
                 <a:solidFill>
                   <a:srgbClr val="0000FF"/>
                 </a:solidFill>
@@ -12820,13 +12790,13 @@
               <a:t>public</a:t>
             </a:r>
             <a:r>
-              <a:rPr lang="en-US" sz="1200" dirty="0" smtClean="0">
+              <a:rPr lang="en-US" sz="1100" dirty="0" smtClean="0">
                 <a:latin typeface="Consolas"/>
               </a:rPr>
               <a:t> </a:t>
             </a:r>
             <a:r>
-              <a:rPr lang="en-US" sz="1200" dirty="0" smtClean="0">
+              <a:rPr lang="en-US" sz="1100" dirty="0" smtClean="0">
                 <a:solidFill>
                   <a:srgbClr val="0000FF"/>
                 </a:solidFill>
@@ -12835,13 +12805,13 @@
               <a:t>void</a:t>
             </a:r>
             <a:r>
-              <a:rPr lang="en-US" sz="1200" dirty="0" smtClean="0">
+              <a:rPr lang="en-US" sz="1100" dirty="0" smtClean="0">
                 <a:latin typeface="Consolas"/>
               </a:rPr>
               <a:t> </a:t>
             </a:r>
             <a:r>
-              <a:rPr lang="en-US" sz="1200" dirty="0" err="1" smtClean="0">
+              <a:rPr lang="en-US" sz="1100" dirty="0" err="1" smtClean="0">
                 <a:solidFill>
                   <a:srgbClr val="795E26"/>
                 </a:solidFill>
@@ -12850,7 +12820,7 @@
               <a:t>ToDo</a:t>
             </a:r>
             <a:r>
-              <a:rPr lang="en-US" sz="1200" dirty="0" smtClean="0">
+              <a:rPr lang="en-US" sz="1100" dirty="0" smtClean="0">
                 <a:latin typeface="Consolas"/>
               </a:rPr>
               <a:t>();</a:t>
@@ -12858,24 +12828,24 @@
           </a:p>
           <a:p>
             <a:r>
-              <a:rPr lang="en-US" sz="1200" dirty="0" smtClean="0">
+              <a:rPr lang="en-US" sz="1100" dirty="0" smtClean="0">
                 <a:latin typeface="Consolas"/>
               </a:rPr>
               <a:t/>
             </a:r>
             <a:br>
-              <a:rPr lang="en-US" sz="1200" dirty="0" smtClean="0">
+              <a:rPr lang="en-US" sz="1100" dirty="0" smtClean="0">
                 <a:latin typeface="Consolas"/>
               </a:rPr>
             </a:br>
             <a:r>
-              <a:rPr lang="en-US" sz="1200" dirty="0" smtClean="0">
+              <a:rPr lang="en-US" sz="1100" dirty="0" smtClean="0">
                 <a:latin typeface="Consolas"/>
               </a:rPr>
               <a:t>    </a:t>
             </a:r>
             <a:r>
-              <a:rPr lang="en-US" sz="1200" dirty="0" smtClean="0">
+              <a:rPr lang="en-US" sz="1100" dirty="0" smtClean="0">
                 <a:solidFill>
                   <a:srgbClr val="0000FF"/>
                 </a:solidFill>
@@ -12884,13 +12854,13 @@
               <a:t>public</a:t>
             </a:r>
             <a:r>
-              <a:rPr lang="en-US" sz="1200" dirty="0" smtClean="0">
+              <a:rPr lang="en-US" sz="1100" dirty="0" smtClean="0">
                 <a:latin typeface="Consolas"/>
               </a:rPr>
               <a:t> </a:t>
             </a:r>
             <a:r>
-              <a:rPr lang="en-US" sz="1200" dirty="0" err="1" smtClean="0">
+              <a:rPr lang="en-US" sz="1100" dirty="0" err="1" smtClean="0">
                 <a:solidFill>
                   <a:srgbClr val="0000FF"/>
                 </a:solidFill>
@@ -12899,13 +12869,13 @@
               <a:t>int</a:t>
             </a:r>
             <a:r>
-              <a:rPr lang="en-US" sz="1200" dirty="0" smtClean="0">
+              <a:rPr lang="en-US" sz="1100" dirty="0" smtClean="0">
                 <a:latin typeface="Consolas"/>
               </a:rPr>
               <a:t> </a:t>
             </a:r>
             <a:r>
-              <a:rPr lang="en-US" sz="1200" dirty="0" smtClean="0">
+              <a:rPr lang="en-US" sz="1100" dirty="0" smtClean="0">
                 <a:solidFill>
                   <a:srgbClr val="001080"/>
                 </a:solidFill>
@@ -12913,13 +12883,13 @@
               </a:rPr>
               <a:t>Health</a:t>
             </a:r>
-            <a:endParaRPr lang="en-US" sz="1200" dirty="0" smtClean="0">
+            <a:endParaRPr lang="en-US" sz="1100" dirty="0" smtClean="0">
               <a:latin typeface="Consolas"/>
             </a:endParaRPr>
           </a:p>
           <a:p>
             <a:r>
-              <a:rPr lang="en-US" sz="1200" dirty="0" smtClean="0">
+              <a:rPr lang="en-US" sz="1100" dirty="0" smtClean="0">
                 <a:latin typeface="Consolas"/>
               </a:rPr>
               <a:t>    { </a:t>
@@ -12927,13 +12897,13 @@
           </a:p>
           <a:p>
             <a:r>
-              <a:rPr lang="en-US" sz="1200" dirty="0" smtClean="0">
+              <a:rPr lang="en-US" sz="1100" dirty="0" smtClean="0">
                 <a:latin typeface="Consolas"/>
               </a:rPr>
               <a:t>        </a:t>
             </a:r>
             <a:r>
-              <a:rPr lang="en-US" sz="1200" dirty="0" smtClean="0">
+              <a:rPr lang="en-US" sz="1100" dirty="0" smtClean="0">
                 <a:solidFill>
                   <a:srgbClr val="0000FF"/>
                 </a:solidFill>
@@ -12942,7 +12912,7 @@
               <a:t>get</a:t>
             </a:r>
             <a:r>
-              <a:rPr lang="en-US" sz="1200" dirty="0" smtClean="0">
+              <a:rPr lang="en-US" sz="1100" dirty="0" smtClean="0">
                 <a:latin typeface="Consolas"/>
               </a:rPr>
               <a:t> </a:t>
@@ -12950,7 +12920,7 @@
           </a:p>
           <a:p>
             <a:r>
-              <a:rPr lang="en-US" sz="1200" dirty="0" smtClean="0">
+              <a:rPr lang="en-US" sz="1100" dirty="0" smtClean="0">
                 <a:latin typeface="Consolas"/>
               </a:rPr>
               <a:t>        { </a:t>
@@ -12958,13 +12928,13 @@
           </a:p>
           <a:p>
             <a:r>
-              <a:rPr lang="en-US" sz="1200" dirty="0" smtClean="0">
+              <a:rPr lang="en-US" sz="1100" dirty="0" smtClean="0">
                 <a:latin typeface="Consolas"/>
               </a:rPr>
               <a:t>            </a:t>
             </a:r>
             <a:r>
-              <a:rPr lang="en-US" sz="1200" dirty="0" smtClean="0">
+              <a:rPr lang="en-US" sz="1100" dirty="0" smtClean="0">
                 <a:solidFill>
                   <a:srgbClr val="AF00DB"/>
                 </a:solidFill>
@@ -12973,13 +12943,13 @@
               <a:t>return</a:t>
             </a:r>
             <a:r>
-              <a:rPr lang="en-US" sz="1200" dirty="0" smtClean="0">
+              <a:rPr lang="en-US" sz="1100" dirty="0" smtClean="0">
                 <a:latin typeface="Consolas"/>
               </a:rPr>
               <a:t> </a:t>
             </a:r>
             <a:r>
-              <a:rPr lang="en-US" sz="1200" dirty="0" smtClean="0">
+              <a:rPr lang="en-US" sz="1100" dirty="0" smtClean="0">
                 <a:solidFill>
                   <a:srgbClr val="098658"/>
                 </a:solidFill>
@@ -12988,7 +12958,7 @@
               <a:t>100</a:t>
             </a:r>
             <a:r>
-              <a:rPr lang="en-US" sz="1200" dirty="0" smtClean="0">
+              <a:rPr lang="en-US" sz="1100" dirty="0" smtClean="0">
                 <a:latin typeface="Consolas"/>
               </a:rPr>
               <a:t>; </a:t>
@@ -12996,7 +12966,7 @@
           </a:p>
           <a:p>
             <a:r>
-              <a:rPr lang="en-US" sz="1200" dirty="0" smtClean="0">
+              <a:rPr lang="en-US" sz="1100" dirty="0" smtClean="0">
                 <a:latin typeface="Consolas"/>
               </a:rPr>
               <a:t>        } </a:t>
@@ -13004,7 +12974,7 @@
           </a:p>
           <a:p>
             <a:r>
-              <a:rPr lang="en-US" sz="1200" dirty="0" smtClean="0">
+              <a:rPr lang="en-US" sz="1100" dirty="0" smtClean="0">
                 <a:latin typeface="Consolas"/>
               </a:rPr>
               <a:t>    }</a:t>
@@ -13012,24 +12982,24 @@
           </a:p>
           <a:p>
             <a:r>
-              <a:rPr lang="en-US" sz="1200" dirty="0" smtClean="0">
+              <a:rPr lang="en-US" sz="1100" dirty="0" smtClean="0">
                 <a:latin typeface="Consolas"/>
               </a:rPr>
               <a:t/>
             </a:r>
             <a:br>
-              <a:rPr lang="en-US" sz="1200" dirty="0" smtClean="0">
+              <a:rPr lang="en-US" sz="1100" dirty="0" smtClean="0">
                 <a:latin typeface="Consolas"/>
               </a:rPr>
             </a:br>
             <a:r>
-              <a:rPr lang="en-US" sz="1200" dirty="0" smtClean="0">
+              <a:rPr lang="en-US" sz="1100" dirty="0" smtClean="0">
                 <a:latin typeface="Consolas"/>
               </a:rPr>
               <a:t>    </a:t>
             </a:r>
             <a:r>
-              <a:rPr lang="en-US" sz="1200" dirty="0" smtClean="0">
+              <a:rPr lang="en-US" sz="1100" dirty="0" smtClean="0">
                 <a:solidFill>
                   <a:srgbClr val="0000FF"/>
                 </a:solidFill>
@@ -13038,13 +13008,13 @@
               <a:t>public</a:t>
             </a:r>
             <a:r>
-              <a:rPr lang="en-US" sz="1200" dirty="0" smtClean="0">
+              <a:rPr lang="en-US" sz="1100" dirty="0" smtClean="0">
                 <a:latin typeface="Consolas"/>
               </a:rPr>
               <a:t> </a:t>
             </a:r>
             <a:r>
-              <a:rPr lang="en-US" sz="1200" dirty="0" smtClean="0">
+              <a:rPr lang="en-US" sz="1100" dirty="0" smtClean="0">
                 <a:solidFill>
                   <a:srgbClr val="0000FF"/>
                 </a:solidFill>
@@ -13053,13 +13023,13 @@
               <a:t>void</a:t>
             </a:r>
             <a:r>
-              <a:rPr lang="en-US" sz="1200" dirty="0" smtClean="0">
+              <a:rPr lang="en-US" sz="1100" dirty="0" smtClean="0">
                 <a:latin typeface="Consolas"/>
               </a:rPr>
               <a:t> </a:t>
             </a:r>
             <a:r>
-              <a:rPr lang="en-US" sz="1200" dirty="0" err="1" smtClean="0">
+              <a:rPr lang="en-US" sz="1100" dirty="0" err="1" smtClean="0">
                 <a:solidFill>
                   <a:srgbClr val="795E26"/>
                 </a:solidFill>
@@ -13068,7 +13038,7 @@
               <a:t>SubmitRapport</a:t>
             </a:r>
             <a:r>
-              <a:rPr lang="en-US" sz="1200" dirty="0" smtClean="0">
+              <a:rPr lang="en-US" sz="1100" dirty="0" smtClean="0">
                 <a:latin typeface="Consolas"/>
               </a:rPr>
               <a:t>()</a:t>
@@ -13076,7 +13046,7 @@
           </a:p>
           <a:p>
             <a:r>
-              <a:rPr lang="en-US" sz="1200" dirty="0" smtClean="0">
+              <a:rPr lang="en-US" sz="1100" dirty="0" smtClean="0">
                 <a:latin typeface="Consolas"/>
               </a:rPr>
               <a:t>    {</a:t>
@@ -13084,13 +13054,13 @@
           </a:p>
           <a:p>
             <a:r>
-              <a:rPr lang="en-US" sz="1200" dirty="0" smtClean="0">
+              <a:rPr lang="en-US" sz="1100" dirty="0" smtClean="0">
                 <a:latin typeface="Consolas"/>
               </a:rPr>
               <a:t>        </a:t>
             </a:r>
             <a:r>
-              <a:rPr lang="en-US" sz="1200" dirty="0" err="1" smtClean="0">
+              <a:rPr lang="en-US" sz="1100" dirty="0" err="1" smtClean="0">
                 <a:solidFill>
                   <a:srgbClr val="001080"/>
                 </a:solidFill>
@@ -13099,13 +13069,13 @@
               <a:t>Console</a:t>
             </a:r>
             <a:r>
-              <a:rPr lang="en-US" sz="1200" dirty="0" err="1" smtClean="0">
+              <a:rPr lang="en-US" sz="1100" dirty="0" err="1" smtClean="0">
                 <a:latin typeface="Consolas"/>
               </a:rPr>
               <a:t>.</a:t>
             </a:r>
             <a:r>
-              <a:rPr lang="en-US" sz="1200" dirty="0" err="1" smtClean="0">
+              <a:rPr lang="en-US" sz="1100" dirty="0" err="1" smtClean="0">
                 <a:solidFill>
                   <a:srgbClr val="795E26"/>
                 </a:solidFill>
@@ -13114,13 +13084,13 @@
               <a:t>WriteLine</a:t>
             </a:r>
             <a:r>
-              <a:rPr lang="en-US" sz="1200" dirty="0" smtClean="0">
+              <a:rPr lang="en-US" sz="1100" dirty="0" smtClean="0">
                 <a:latin typeface="Consolas"/>
               </a:rPr>
               <a:t>(</a:t>
             </a:r>
             <a:r>
-              <a:rPr lang="en-US" sz="1200" dirty="0" smtClean="0">
+              <a:rPr lang="en-US" sz="1100" dirty="0" smtClean="0">
                 <a:solidFill>
                   <a:srgbClr val="A31515"/>
                 </a:solidFill>
@@ -13129,7 +13099,7 @@
               <a:t>"</a:t>
             </a:r>
             <a:r>
-              <a:rPr lang="ru-RU" sz="1200" dirty="0" smtClean="0">
+              <a:rPr lang="ru-RU" sz="1100" dirty="0" smtClean="0">
                 <a:solidFill>
                   <a:srgbClr val="A31515"/>
                 </a:solidFill>
@@ -13138,7 +13108,7 @@
               <a:t>Солдат сдал раппорт!"</a:t>
             </a:r>
             <a:r>
-              <a:rPr lang="ru-RU" sz="1200" dirty="0" smtClean="0">
+              <a:rPr lang="ru-RU" sz="1100" dirty="0" smtClean="0">
                 <a:latin typeface="Consolas"/>
               </a:rPr>
               <a:t>);</a:t>
@@ -13146,7 +13116,7 @@
           </a:p>
           <a:p>
             <a:r>
-              <a:rPr lang="ru-RU" sz="1200" dirty="0" smtClean="0">
+              <a:rPr lang="ru-RU" sz="1100" dirty="0" smtClean="0">
                 <a:latin typeface="Consolas"/>
               </a:rPr>
               <a:t>    }</a:t>
@@ -13154,12 +13124,12 @@
           </a:p>
           <a:p>
             <a:r>
-              <a:rPr lang="ru-RU" sz="1200" dirty="0" smtClean="0">
+              <a:rPr lang="ru-RU" sz="1100" dirty="0" smtClean="0">
                 <a:latin typeface="Consolas"/>
               </a:rPr>
               <a:t>}</a:t>
             </a:r>
-            <a:endParaRPr lang="ru-RU" sz="1200" dirty="0">
+            <a:endParaRPr lang="ru-RU" sz="1100" dirty="0">
               <a:latin typeface="Consolas"/>
             </a:endParaRPr>
           </a:p>
@@ -13254,7 +13224,7 @@
         <p:spPr>
           <a:xfrm>
             <a:off x="500550" y="1164114"/>
-            <a:ext cx="3936438" cy="2677656"/>
+            <a:ext cx="3936438" cy="2893100"/>
           </a:xfrm>
           <a:prstGeom prst="rect">
             <a:avLst/>
@@ -13272,7 +13242,45 @@
             </a:r>
             <a:r>
               <a:rPr lang="ru-RU" dirty="0" smtClean="0"/>
-              <a:t>— это класс, который может содержать методы без реализации. Такие методы называются абстрактными.</a:t>
+              <a:t>— это класс, который помечен ключевым словом </a:t>
+            </a:r>
+            <a:r>
+              <a:rPr lang="en-US" dirty="0" smtClean="0">
+                <a:solidFill>
+                  <a:srgbClr val="0000FF"/>
+                </a:solidFill>
+                <a:latin typeface="Consolas" panose="020B0609020204030204" pitchFamily="49" charset="0"/>
+              </a:rPr>
+              <a:t>abstract</a:t>
+            </a:r>
+            <a:r>
+              <a:rPr lang="ru-RU" dirty="0" smtClean="0">
+                <a:solidFill>
+                  <a:srgbClr val="0000FF"/>
+                </a:solidFill>
+                <a:latin typeface="Consolas" panose="020B0609020204030204" pitchFamily="49" charset="0"/>
+              </a:rPr>
+              <a:t> </a:t>
+            </a:r>
+            <a:r>
+              <a:rPr lang="ru-RU" dirty="0" smtClean="0"/>
+              <a:t>и</a:t>
+            </a:r>
+            <a:r>
+              <a:rPr lang="ru-RU" i="1" dirty="0" smtClean="0"/>
+              <a:t> может</a:t>
+            </a:r>
+            <a:r>
+              <a:rPr lang="ru-RU" dirty="0" smtClean="0"/>
+              <a:t> содержать методы </a:t>
+            </a:r>
+            <a:r>
+              <a:rPr lang="ru-RU" smtClean="0"/>
+              <a:t>без реализации. </a:t>
+            </a:r>
+            <a:r>
+              <a:rPr lang="ru-RU" dirty="0" smtClean="0"/>
+              <a:t>Такие методы называются абстрактными.</a:t>
             </a:r>
           </a:p>
           <a:p>
@@ -13327,7 +13335,7 @@
         <p:spPr>
           <a:xfrm>
             <a:off x="4759177" y="1164114"/>
-            <a:ext cx="3728174" cy="3046988"/>
+            <a:ext cx="3728174" cy="2800767"/>
           </a:xfrm>
           <a:prstGeom prst="rect">
             <a:avLst/>
@@ -13340,7 +13348,7 @@
           <a:lstStyle/>
           <a:p>
             <a:r>
-              <a:rPr lang="en-US" sz="1200" b="1" dirty="0" smtClean="0">
+              <a:rPr lang="en-US" sz="1100" b="1" dirty="0" smtClean="0">
                 <a:solidFill>
                   <a:srgbClr val="FF0000"/>
                 </a:solidFill>
@@ -13349,13 +13357,13 @@
               <a:t>abstract class</a:t>
             </a:r>
             <a:r>
-              <a:rPr lang="en-US" sz="1200" b="1" dirty="0" smtClean="0">
+              <a:rPr lang="en-US" sz="1100" b="1" dirty="0" smtClean="0">
                 <a:latin typeface="Consolas"/>
               </a:rPr>
               <a:t> </a:t>
             </a:r>
             <a:r>
-              <a:rPr lang="en-US" sz="1200" dirty="0" smtClean="0">
+              <a:rPr lang="en-US" sz="1100" dirty="0" smtClean="0">
                 <a:solidFill>
                   <a:srgbClr val="267F99"/>
                 </a:solidFill>
@@ -13363,13 +13371,13 @@
               </a:rPr>
               <a:t>Human</a:t>
             </a:r>
-            <a:endParaRPr lang="en-US" sz="1200" dirty="0" smtClean="0">
+            <a:endParaRPr lang="en-US" sz="1100" dirty="0" smtClean="0">
               <a:latin typeface="Consolas"/>
             </a:endParaRPr>
           </a:p>
           <a:p>
             <a:r>
-              <a:rPr lang="en-US" sz="1200" dirty="0" smtClean="0">
+              <a:rPr lang="en-US" sz="1100" dirty="0" smtClean="0">
                 <a:latin typeface="Consolas"/>
               </a:rPr>
               <a:t>{</a:t>
@@ -13377,13 +13385,13 @@
           </a:p>
           <a:p>
             <a:r>
-              <a:rPr lang="en-US" sz="1200" dirty="0" smtClean="0">
+              <a:rPr lang="en-US" sz="1100" dirty="0" smtClean="0">
                 <a:latin typeface="Consolas"/>
               </a:rPr>
               <a:t>    </a:t>
             </a:r>
             <a:r>
-              <a:rPr lang="en-US" sz="1200" dirty="0" smtClean="0">
+              <a:rPr lang="en-US" sz="1100" dirty="0" smtClean="0">
                 <a:solidFill>
                   <a:srgbClr val="0000FF"/>
                 </a:solidFill>
@@ -13392,13 +13400,13 @@
               <a:t>private</a:t>
             </a:r>
             <a:r>
-              <a:rPr lang="en-US" sz="1200" dirty="0" smtClean="0">
+              <a:rPr lang="en-US" sz="1100" dirty="0" smtClean="0">
                 <a:latin typeface="Consolas"/>
               </a:rPr>
               <a:t> </a:t>
             </a:r>
             <a:r>
-              <a:rPr lang="en-US" sz="1200" dirty="0" smtClean="0">
+              <a:rPr lang="en-US" sz="1100" dirty="0" smtClean="0">
                 <a:solidFill>
                   <a:srgbClr val="0000FF"/>
                 </a:solidFill>
@@ -13407,13 +13415,13 @@
               <a:t>string</a:t>
             </a:r>
             <a:r>
-              <a:rPr lang="en-US" sz="1200" dirty="0" smtClean="0">
+              <a:rPr lang="en-US" sz="1100" dirty="0" smtClean="0">
                 <a:latin typeface="Consolas"/>
               </a:rPr>
               <a:t> </a:t>
             </a:r>
             <a:r>
-              <a:rPr lang="en-US" sz="1200" dirty="0" smtClean="0">
+              <a:rPr lang="en-US" sz="1100" dirty="0" smtClean="0">
                 <a:solidFill>
                   <a:srgbClr val="001080"/>
                 </a:solidFill>
@@ -13422,7 +13430,7 @@
               <a:t>name</a:t>
             </a:r>
             <a:r>
-              <a:rPr lang="en-US" sz="1200" dirty="0" smtClean="0">
+              <a:rPr lang="en-US" sz="1100" dirty="0" smtClean="0">
                 <a:latin typeface="Consolas"/>
               </a:rPr>
               <a:t>;</a:t>
@@ -13430,24 +13438,24 @@
           </a:p>
           <a:p>
             <a:r>
-              <a:rPr lang="en-US" sz="1200" dirty="0" smtClean="0">
+              <a:rPr lang="en-US" sz="1100" dirty="0" smtClean="0">
                 <a:latin typeface="Consolas"/>
               </a:rPr>
               <a:t/>
             </a:r>
             <a:br>
-              <a:rPr lang="en-US" sz="1200" dirty="0" smtClean="0">
+              <a:rPr lang="en-US" sz="1100" dirty="0" smtClean="0">
                 <a:latin typeface="Consolas"/>
               </a:rPr>
             </a:br>
             <a:r>
-              <a:rPr lang="en-US" sz="1200" dirty="0" smtClean="0">
+              <a:rPr lang="en-US" sz="1100" dirty="0" smtClean="0">
                 <a:latin typeface="Consolas"/>
               </a:rPr>
               <a:t>    </a:t>
             </a:r>
             <a:r>
-              <a:rPr lang="en-US" sz="1200" b="1" dirty="0" smtClean="0">
+              <a:rPr lang="en-US" sz="1100" b="1" dirty="0" smtClean="0">
                 <a:solidFill>
                   <a:srgbClr val="FF0000"/>
                 </a:solidFill>
@@ -13456,13 +13464,13 @@
               <a:t>abstract</a:t>
             </a:r>
             <a:r>
-              <a:rPr lang="en-US" sz="1200" dirty="0" smtClean="0">
+              <a:rPr lang="en-US" sz="1100" dirty="0" smtClean="0">
                 <a:latin typeface="Consolas"/>
               </a:rPr>
               <a:t> </a:t>
             </a:r>
             <a:r>
-              <a:rPr lang="en-US" sz="1200" dirty="0" smtClean="0">
+              <a:rPr lang="en-US" sz="1100" dirty="0" smtClean="0">
                 <a:solidFill>
                   <a:srgbClr val="0000FF"/>
                 </a:solidFill>
@@ -13471,13 +13479,13 @@
               <a:t>public</a:t>
             </a:r>
             <a:r>
-              <a:rPr lang="en-US" sz="1200" dirty="0" smtClean="0">
+              <a:rPr lang="en-US" sz="1100" dirty="0" smtClean="0">
                 <a:latin typeface="Consolas"/>
               </a:rPr>
               <a:t> </a:t>
             </a:r>
             <a:r>
-              <a:rPr lang="en-US" sz="1200" dirty="0" smtClean="0">
+              <a:rPr lang="en-US" sz="1100" dirty="0" smtClean="0">
                 <a:solidFill>
                   <a:srgbClr val="0000FF"/>
                 </a:solidFill>
@@ -13486,13 +13494,13 @@
               <a:t>void</a:t>
             </a:r>
             <a:r>
-              <a:rPr lang="en-US" sz="1200" dirty="0" smtClean="0">
+              <a:rPr lang="en-US" sz="1100" dirty="0" smtClean="0">
                 <a:latin typeface="Consolas"/>
               </a:rPr>
               <a:t> </a:t>
             </a:r>
             <a:r>
-              <a:rPr lang="en-US" sz="1200" dirty="0" err="1" smtClean="0">
+              <a:rPr lang="en-US" sz="1100" dirty="0" err="1" smtClean="0">
                 <a:solidFill>
                   <a:srgbClr val="795E26"/>
                 </a:solidFill>
@@ -13501,7 +13509,7 @@
               <a:t>JustGo</a:t>
             </a:r>
             <a:r>
-              <a:rPr lang="en-US" sz="1200" dirty="0" smtClean="0">
+              <a:rPr lang="en-US" sz="1100" dirty="0" smtClean="0">
                 <a:latin typeface="Consolas"/>
               </a:rPr>
               <a:t>();</a:t>
@@ -13509,24 +13517,24 @@
           </a:p>
           <a:p>
             <a:r>
-              <a:rPr lang="en-US" sz="1200" dirty="0" smtClean="0">
+              <a:rPr lang="en-US" sz="1100" dirty="0" smtClean="0">
                 <a:latin typeface="Consolas"/>
               </a:rPr>
               <a:t/>
             </a:r>
             <a:br>
-              <a:rPr lang="en-US" sz="1200" dirty="0" smtClean="0">
+              <a:rPr lang="en-US" sz="1100" dirty="0" smtClean="0">
                 <a:latin typeface="Consolas"/>
               </a:rPr>
             </a:br>
             <a:r>
-              <a:rPr lang="en-US" sz="1200" dirty="0" smtClean="0">
+              <a:rPr lang="en-US" sz="1100" dirty="0" smtClean="0">
                 <a:latin typeface="Consolas"/>
               </a:rPr>
               <a:t>    </a:t>
             </a:r>
             <a:r>
-              <a:rPr lang="en-US" sz="1200" dirty="0" smtClean="0">
+              <a:rPr lang="en-US" sz="1100" dirty="0" smtClean="0">
                 <a:solidFill>
                   <a:srgbClr val="0000FF"/>
                 </a:solidFill>
@@ -13535,13 +13543,13 @@
               <a:t>public</a:t>
             </a:r>
             <a:r>
-              <a:rPr lang="en-US" sz="1200" dirty="0" smtClean="0">
+              <a:rPr lang="en-US" sz="1100" dirty="0" smtClean="0">
                 <a:latin typeface="Consolas"/>
               </a:rPr>
               <a:t> </a:t>
             </a:r>
             <a:r>
-              <a:rPr lang="en-US" sz="1200" dirty="0" smtClean="0">
+              <a:rPr lang="en-US" sz="1100" dirty="0" smtClean="0">
                 <a:solidFill>
                   <a:srgbClr val="0000FF"/>
                 </a:solidFill>
@@ -13550,13 +13558,13 @@
               <a:t>string</a:t>
             </a:r>
             <a:r>
-              <a:rPr lang="en-US" sz="1200" dirty="0" smtClean="0">
+              <a:rPr lang="en-US" sz="1100" dirty="0" smtClean="0">
                 <a:latin typeface="Consolas"/>
               </a:rPr>
               <a:t> </a:t>
             </a:r>
             <a:r>
-              <a:rPr lang="en-US" sz="1200" dirty="0" err="1" smtClean="0">
+              <a:rPr lang="en-US" sz="1100" dirty="0" err="1" smtClean="0">
                 <a:solidFill>
                   <a:srgbClr val="795E26"/>
                 </a:solidFill>
@@ -13565,7 +13573,7 @@
               <a:t>GetName</a:t>
             </a:r>
             <a:r>
-              <a:rPr lang="en-US" sz="1200" dirty="0" smtClean="0">
+              <a:rPr lang="en-US" sz="1100" dirty="0" smtClean="0">
                 <a:latin typeface="Consolas"/>
               </a:rPr>
               <a:t>()</a:t>
@@ -13573,7 +13581,7 @@
           </a:p>
           <a:p>
             <a:r>
-              <a:rPr lang="en-US" sz="1200" dirty="0" smtClean="0">
+              <a:rPr lang="en-US" sz="1100" dirty="0" smtClean="0">
                 <a:latin typeface="Consolas"/>
               </a:rPr>
               <a:t>    {</a:t>
@@ -13581,13 +13589,13 @@
           </a:p>
           <a:p>
             <a:r>
-              <a:rPr lang="en-US" sz="1200" dirty="0" smtClean="0">
+              <a:rPr lang="en-US" sz="1100" dirty="0" smtClean="0">
                 <a:latin typeface="Consolas"/>
               </a:rPr>
               <a:t>        </a:t>
             </a:r>
             <a:r>
-              <a:rPr lang="en-US" sz="1200" dirty="0" smtClean="0">
+              <a:rPr lang="en-US" sz="1100" dirty="0" smtClean="0">
                 <a:solidFill>
                   <a:srgbClr val="AF00DB"/>
                 </a:solidFill>
@@ -13596,13 +13604,13 @@
               <a:t>return</a:t>
             </a:r>
             <a:r>
-              <a:rPr lang="en-US" sz="1200" dirty="0" smtClean="0">
+              <a:rPr lang="en-US" sz="1100" dirty="0" smtClean="0">
                 <a:latin typeface="Consolas"/>
               </a:rPr>
               <a:t> </a:t>
             </a:r>
             <a:r>
-              <a:rPr lang="en-US" sz="1200" dirty="0" smtClean="0">
+              <a:rPr lang="en-US" sz="1100" dirty="0" smtClean="0">
                 <a:solidFill>
                   <a:srgbClr val="0000FF"/>
                 </a:solidFill>
@@ -13611,13 +13619,13 @@
               <a:t>this</a:t>
             </a:r>
             <a:r>
-              <a:rPr lang="en-US" sz="1200" dirty="0" smtClean="0">
+              <a:rPr lang="en-US" sz="1100" dirty="0" smtClean="0">
                 <a:latin typeface="Consolas"/>
               </a:rPr>
               <a:t>.</a:t>
             </a:r>
             <a:r>
-              <a:rPr lang="en-US" sz="1200" dirty="0" smtClean="0">
+              <a:rPr lang="en-US" sz="1100" dirty="0" smtClean="0">
                 <a:solidFill>
                   <a:srgbClr val="001080"/>
                 </a:solidFill>
@@ -13626,7 +13634,7 @@
               <a:t>name</a:t>
             </a:r>
             <a:r>
-              <a:rPr lang="en-US" sz="1200" dirty="0" smtClean="0">
+              <a:rPr lang="en-US" sz="1100" dirty="0" smtClean="0">
                 <a:latin typeface="Consolas"/>
               </a:rPr>
               <a:t>;</a:t>
@@ -13634,7 +13642,7 @@
           </a:p>
           <a:p>
             <a:r>
-              <a:rPr lang="en-US" sz="1200" dirty="0" smtClean="0">
+              <a:rPr lang="en-US" sz="1100" dirty="0" smtClean="0">
                 <a:latin typeface="Consolas"/>
               </a:rPr>
               <a:t>    }</a:t>
@@ -13642,24 +13650,24 @@
           </a:p>
           <a:p>
             <a:r>
-              <a:rPr lang="en-US" sz="1200" dirty="0" smtClean="0">
+              <a:rPr lang="en-US" sz="1100" dirty="0" smtClean="0">
                 <a:latin typeface="Consolas"/>
               </a:rPr>
               <a:t/>
             </a:r>
             <a:br>
-              <a:rPr lang="en-US" sz="1200" dirty="0" smtClean="0">
+              <a:rPr lang="en-US" sz="1100" dirty="0" smtClean="0">
                 <a:latin typeface="Consolas"/>
               </a:rPr>
             </a:br>
             <a:r>
-              <a:rPr lang="en-US" sz="1200" dirty="0" smtClean="0">
+              <a:rPr lang="en-US" sz="1100" dirty="0" smtClean="0">
                 <a:latin typeface="Consolas"/>
               </a:rPr>
               <a:t>    </a:t>
             </a:r>
             <a:r>
-              <a:rPr lang="en-US" sz="1200" dirty="0" smtClean="0">
+              <a:rPr lang="en-US" sz="1100" dirty="0" smtClean="0">
                 <a:solidFill>
                   <a:srgbClr val="0000FF"/>
                 </a:solidFill>
@@ -13668,13 +13676,13 @@
               <a:t>public</a:t>
             </a:r>
             <a:r>
-              <a:rPr lang="en-US" sz="1200" dirty="0" smtClean="0">
+              <a:rPr lang="en-US" sz="1100" dirty="0" smtClean="0">
                 <a:latin typeface="Consolas"/>
               </a:rPr>
               <a:t> </a:t>
             </a:r>
             <a:r>
-              <a:rPr lang="en-US" sz="1200" dirty="0" smtClean="0">
+              <a:rPr lang="en-US" sz="1100" dirty="0" smtClean="0">
                 <a:solidFill>
                   <a:srgbClr val="795E26"/>
                 </a:solidFill>
@@ -13683,13 +13691,13 @@
               <a:t>Human</a:t>
             </a:r>
             <a:r>
-              <a:rPr lang="en-US" sz="1200" dirty="0" smtClean="0">
+              <a:rPr lang="en-US" sz="1100" dirty="0" smtClean="0">
                 <a:latin typeface="Consolas"/>
               </a:rPr>
               <a:t>(</a:t>
             </a:r>
             <a:r>
-              <a:rPr lang="en-US" sz="1200" dirty="0" smtClean="0">
+              <a:rPr lang="en-US" sz="1100" dirty="0" smtClean="0">
                 <a:solidFill>
                   <a:srgbClr val="0000FF"/>
                 </a:solidFill>
@@ -13698,13 +13706,13 @@
               <a:t>string</a:t>
             </a:r>
             <a:r>
-              <a:rPr lang="en-US" sz="1200" dirty="0" smtClean="0">
+              <a:rPr lang="en-US" sz="1100" dirty="0" smtClean="0">
                 <a:latin typeface="Consolas"/>
               </a:rPr>
               <a:t> </a:t>
             </a:r>
             <a:r>
-              <a:rPr lang="en-US" sz="1200" dirty="0" smtClean="0">
+              <a:rPr lang="en-US" sz="1100" dirty="0" smtClean="0">
                 <a:solidFill>
                   <a:srgbClr val="001080"/>
                 </a:solidFill>
@@ -13713,7 +13721,7 @@
               <a:t>name</a:t>
             </a:r>
             <a:r>
-              <a:rPr lang="en-US" sz="1200" dirty="0" smtClean="0">
+              <a:rPr lang="en-US" sz="1100" dirty="0" smtClean="0">
                 <a:latin typeface="Consolas"/>
               </a:rPr>
               <a:t>)</a:t>
@@ -13721,7 +13729,7 @@
           </a:p>
           <a:p>
             <a:r>
-              <a:rPr lang="en-US" sz="1200" dirty="0" smtClean="0">
+              <a:rPr lang="en-US" sz="1100" dirty="0" smtClean="0">
                 <a:latin typeface="Consolas"/>
               </a:rPr>
               <a:t>    {</a:t>
@@ -13729,13 +13737,13 @@
           </a:p>
           <a:p>
             <a:r>
-              <a:rPr lang="en-US" sz="1200" dirty="0" smtClean="0">
+              <a:rPr lang="en-US" sz="1100" dirty="0" smtClean="0">
                 <a:latin typeface="Consolas"/>
               </a:rPr>
               <a:t>        </a:t>
             </a:r>
             <a:r>
-              <a:rPr lang="en-US" sz="1200" dirty="0" smtClean="0">
+              <a:rPr lang="en-US" sz="1100" dirty="0" smtClean="0">
                 <a:solidFill>
                   <a:srgbClr val="0000FF"/>
                 </a:solidFill>
@@ -13744,13 +13752,13 @@
               <a:t>this</a:t>
             </a:r>
             <a:r>
-              <a:rPr lang="en-US" sz="1200" dirty="0" smtClean="0">
+              <a:rPr lang="en-US" sz="1100" dirty="0" smtClean="0">
                 <a:latin typeface="Consolas"/>
               </a:rPr>
               <a:t>.</a:t>
             </a:r>
             <a:r>
-              <a:rPr lang="en-US" sz="1200" dirty="0" smtClean="0">
+              <a:rPr lang="en-US" sz="1100" dirty="0" smtClean="0">
                 <a:solidFill>
                   <a:srgbClr val="001080"/>
                 </a:solidFill>
@@ -13759,13 +13767,13 @@
               <a:t>name</a:t>
             </a:r>
             <a:r>
-              <a:rPr lang="en-US" sz="1200" dirty="0" smtClean="0">
+              <a:rPr lang="en-US" sz="1100" dirty="0" smtClean="0">
                 <a:latin typeface="Consolas"/>
               </a:rPr>
               <a:t> = </a:t>
             </a:r>
             <a:r>
-              <a:rPr lang="en-US" sz="1200" dirty="0" smtClean="0">
+              <a:rPr lang="en-US" sz="1100" dirty="0" smtClean="0">
                 <a:solidFill>
                   <a:srgbClr val="001080"/>
                 </a:solidFill>
@@ -13774,7 +13782,7 @@
               <a:t>name</a:t>
             </a:r>
             <a:r>
-              <a:rPr lang="en-US" sz="1200" dirty="0" smtClean="0">
+              <a:rPr lang="en-US" sz="1100" dirty="0" smtClean="0">
                 <a:latin typeface="Consolas"/>
               </a:rPr>
               <a:t>;</a:t>
@@ -13782,7 +13790,7 @@
           </a:p>
           <a:p>
             <a:r>
-              <a:rPr lang="en-US" sz="1200" dirty="0" smtClean="0">
+              <a:rPr lang="en-US" sz="1100" dirty="0" smtClean="0">
                 <a:latin typeface="Consolas"/>
               </a:rPr>
               <a:t>    }</a:t>
@@ -13790,12 +13798,12 @@
           </a:p>
           <a:p>
             <a:r>
-              <a:rPr lang="en-US" sz="1200" dirty="0" smtClean="0">
+              <a:rPr lang="en-US" sz="1100" dirty="0" smtClean="0">
                 <a:latin typeface="Consolas"/>
               </a:rPr>
               <a:t>}</a:t>
             </a:r>
-            <a:endParaRPr lang="en-US" sz="1200" dirty="0">
+            <a:endParaRPr lang="en-US" sz="1100" dirty="0">
               <a:latin typeface="Consolas"/>
             </a:endParaRPr>
           </a:p>
@@ -14035,7 +14043,7 @@
         <p:spPr>
           <a:xfrm>
             <a:off x="5226096" y="1166384"/>
-            <a:ext cx="3644964" cy="3600986"/>
+            <a:ext cx="3644964" cy="3308598"/>
           </a:xfrm>
           <a:prstGeom prst="rect">
             <a:avLst/>
@@ -14048,7 +14056,7 @@
           <a:lstStyle/>
           <a:p>
             <a:r>
-              <a:rPr lang="en-US" sz="1200" dirty="0">
+              <a:rPr lang="en-US" sz="1100" dirty="0">
                 <a:solidFill>
                   <a:srgbClr val="0000FF"/>
                 </a:solidFill>
@@ -14057,13 +14065,13 @@
               <a:t>public</a:t>
             </a:r>
             <a:r>
-              <a:rPr lang="en-US" sz="1200" dirty="0">
+              <a:rPr lang="en-US" sz="1100" dirty="0">
                 <a:latin typeface="Consolas" panose="020B0609020204030204" pitchFamily="49" charset="0"/>
               </a:rPr>
               <a:t> </a:t>
             </a:r>
             <a:r>
-              <a:rPr lang="en-US" sz="1200" b="1" dirty="0">
+              <a:rPr lang="en-US" sz="1100" b="1" dirty="0">
                 <a:solidFill>
                   <a:srgbClr val="FF0000"/>
                 </a:solidFill>
@@ -14072,13 +14080,13 @@
               <a:t>abstract</a:t>
             </a:r>
             <a:r>
-              <a:rPr lang="en-US" sz="1200" dirty="0">
+              <a:rPr lang="en-US" sz="1100" dirty="0">
                 <a:latin typeface="Consolas" panose="020B0609020204030204" pitchFamily="49" charset="0"/>
               </a:rPr>
               <a:t> </a:t>
             </a:r>
             <a:r>
-              <a:rPr lang="en-US" sz="1200" dirty="0">
+              <a:rPr lang="en-US" sz="1100" dirty="0">
                 <a:solidFill>
                   <a:srgbClr val="0000FF"/>
                 </a:solidFill>
@@ -14087,13 +14095,13 @@
               <a:t>class</a:t>
             </a:r>
             <a:r>
-              <a:rPr lang="en-US" sz="1200" dirty="0">
+              <a:rPr lang="en-US" sz="1100" dirty="0">
                 <a:latin typeface="Consolas" panose="020B0609020204030204" pitchFamily="49" charset="0"/>
               </a:rPr>
               <a:t> </a:t>
             </a:r>
             <a:r>
-              <a:rPr lang="en-US" sz="1200" dirty="0">
+              <a:rPr lang="en-US" sz="1100" dirty="0">
                 <a:solidFill>
                   <a:srgbClr val="267F99"/>
                 </a:solidFill>
@@ -14101,13 +14109,13 @@
               </a:rPr>
               <a:t>Animal</a:t>
             </a:r>
-            <a:endParaRPr lang="en-US" sz="1200" dirty="0">
+            <a:endParaRPr lang="en-US" sz="1100" dirty="0">
               <a:latin typeface="Consolas" panose="020B0609020204030204" pitchFamily="49" charset="0"/>
             </a:endParaRPr>
           </a:p>
           <a:p>
             <a:r>
-              <a:rPr lang="en-US" sz="1200" dirty="0">
+              <a:rPr lang="en-US" sz="1100" dirty="0">
                 <a:latin typeface="Consolas" panose="020B0609020204030204" pitchFamily="49" charset="0"/>
               </a:rPr>
               <a:t>{</a:t>
@@ -14115,13 +14123,13 @@
           </a:p>
           <a:p>
             <a:r>
-              <a:rPr lang="en-US" sz="1200" dirty="0">
+              <a:rPr lang="en-US" sz="1100" dirty="0">
                 <a:latin typeface="Consolas" panose="020B0609020204030204" pitchFamily="49" charset="0"/>
               </a:rPr>
               <a:t>    </a:t>
             </a:r>
             <a:r>
-              <a:rPr lang="en-US" sz="1200" dirty="0">
+              <a:rPr lang="en-US" sz="1100" dirty="0">
                 <a:solidFill>
                   <a:srgbClr val="0000FF"/>
                 </a:solidFill>
@@ -14130,13 +14138,13 @@
               <a:t>private</a:t>
             </a:r>
             <a:r>
-              <a:rPr lang="en-US" sz="1200" dirty="0">
+              <a:rPr lang="en-US" sz="1100" dirty="0">
                 <a:latin typeface="Consolas" panose="020B0609020204030204" pitchFamily="49" charset="0"/>
               </a:rPr>
               <a:t> </a:t>
             </a:r>
             <a:r>
-              <a:rPr lang="en-US" sz="1200" dirty="0">
+              <a:rPr lang="en-US" sz="1100" dirty="0">
                 <a:solidFill>
                   <a:srgbClr val="0000FF"/>
                 </a:solidFill>
@@ -14145,13 +14153,13 @@
               <a:t>string</a:t>
             </a:r>
             <a:r>
-              <a:rPr lang="en-US" sz="1200" dirty="0">
+              <a:rPr lang="en-US" sz="1100" dirty="0">
                 <a:latin typeface="Consolas" panose="020B0609020204030204" pitchFamily="49" charset="0"/>
               </a:rPr>
               <a:t> </a:t>
             </a:r>
             <a:r>
-              <a:rPr lang="en-US" sz="1200" dirty="0">
+              <a:rPr lang="en-US" sz="1100" dirty="0">
                 <a:solidFill>
                   <a:srgbClr val="001080"/>
                 </a:solidFill>
@@ -14160,7 +14168,7 @@
               <a:t>name</a:t>
             </a:r>
             <a:r>
-              <a:rPr lang="en-US" sz="1200" dirty="0">
+              <a:rPr lang="en-US" sz="1100" dirty="0">
                 <a:latin typeface="Consolas" panose="020B0609020204030204" pitchFamily="49" charset="0"/>
               </a:rPr>
               <a:t>;</a:t>
@@ -14168,24 +14176,24 @@
           </a:p>
           <a:p>
             <a:r>
-              <a:rPr lang="en-US" sz="1200" dirty="0">
+              <a:rPr lang="en-US" sz="1100" dirty="0">
                 <a:latin typeface="Consolas" panose="020B0609020204030204" pitchFamily="49" charset="0"/>
               </a:rPr>
               <a:t/>
             </a:r>
             <a:br>
-              <a:rPr lang="en-US" sz="1200" dirty="0">
+              <a:rPr lang="en-US" sz="1100" dirty="0">
                 <a:latin typeface="Consolas" panose="020B0609020204030204" pitchFamily="49" charset="0"/>
               </a:rPr>
             </a:br>
             <a:r>
-              <a:rPr lang="en-US" sz="1200" dirty="0">
+              <a:rPr lang="en-US" sz="1100" dirty="0">
                 <a:latin typeface="Consolas" panose="020B0609020204030204" pitchFamily="49" charset="0"/>
               </a:rPr>
               <a:t>    </a:t>
             </a:r>
             <a:r>
-              <a:rPr lang="en-US" sz="1200" dirty="0">
+              <a:rPr lang="en-US" sz="1100" dirty="0">
                 <a:solidFill>
                   <a:srgbClr val="0000FF"/>
                 </a:solidFill>
@@ -14194,13 +14202,13 @@
               <a:t>public</a:t>
             </a:r>
             <a:r>
-              <a:rPr lang="en-US" sz="1200" dirty="0">
+              <a:rPr lang="en-US" sz="1100" dirty="0">
                 <a:latin typeface="Consolas" panose="020B0609020204030204" pitchFamily="49" charset="0"/>
               </a:rPr>
               <a:t> </a:t>
             </a:r>
             <a:r>
-              <a:rPr lang="en-US" sz="1200" dirty="0">
+              <a:rPr lang="en-US" sz="1100" dirty="0">
                 <a:solidFill>
                   <a:srgbClr val="0000FF"/>
                 </a:solidFill>
@@ -14209,13 +14217,13 @@
               <a:t>string</a:t>
             </a:r>
             <a:r>
-              <a:rPr lang="en-US" sz="1200" dirty="0">
+              <a:rPr lang="en-US" sz="1100" dirty="0">
                 <a:latin typeface="Consolas" panose="020B0609020204030204" pitchFamily="49" charset="0"/>
               </a:rPr>
               <a:t> </a:t>
             </a:r>
             <a:r>
-              <a:rPr lang="en-US" sz="1200" dirty="0" err="1">
+              <a:rPr lang="en-US" sz="1100" dirty="0" err="1">
                 <a:solidFill>
                   <a:srgbClr val="795E26"/>
                 </a:solidFill>
@@ -14224,7 +14232,7 @@
               <a:t>GetName</a:t>
             </a:r>
             <a:r>
-              <a:rPr lang="en-US" sz="1200" dirty="0">
+              <a:rPr lang="en-US" sz="1100" dirty="0">
                 <a:latin typeface="Consolas" panose="020B0609020204030204" pitchFamily="49" charset="0"/>
               </a:rPr>
               <a:t>()</a:t>
@@ -14232,7 +14240,7 @@
           </a:p>
           <a:p>
             <a:r>
-              <a:rPr lang="en-US" sz="1200" dirty="0">
+              <a:rPr lang="en-US" sz="1100" dirty="0">
                 <a:latin typeface="Consolas" panose="020B0609020204030204" pitchFamily="49" charset="0"/>
               </a:rPr>
               <a:t>    {  </a:t>
@@ -14240,13 +14248,13 @@
           </a:p>
           <a:p>
             <a:r>
-              <a:rPr lang="en-US" sz="1200" dirty="0">
+              <a:rPr lang="en-US" sz="1100" dirty="0">
                 <a:latin typeface="Consolas" panose="020B0609020204030204" pitchFamily="49" charset="0"/>
               </a:rPr>
               <a:t>        </a:t>
             </a:r>
             <a:r>
-              <a:rPr lang="en-US" sz="1200" dirty="0">
+              <a:rPr lang="en-US" sz="1100" dirty="0">
                 <a:solidFill>
                   <a:srgbClr val="AF00DB"/>
                 </a:solidFill>
@@ -14255,13 +14263,13 @@
               <a:t>return</a:t>
             </a:r>
             <a:r>
-              <a:rPr lang="en-US" sz="1200" dirty="0">
+              <a:rPr lang="en-US" sz="1100" dirty="0">
                 <a:latin typeface="Consolas" panose="020B0609020204030204" pitchFamily="49" charset="0"/>
               </a:rPr>
               <a:t> </a:t>
             </a:r>
             <a:r>
-              <a:rPr lang="en-US" sz="1200" dirty="0">
+              <a:rPr lang="en-US" sz="1100" dirty="0">
                 <a:solidFill>
                   <a:srgbClr val="0000FF"/>
                 </a:solidFill>
@@ -14270,13 +14278,13 @@
               <a:t>this</a:t>
             </a:r>
             <a:r>
-              <a:rPr lang="en-US" sz="1200" dirty="0">
+              <a:rPr lang="en-US" sz="1100" dirty="0">
                 <a:latin typeface="Consolas" panose="020B0609020204030204" pitchFamily="49" charset="0"/>
               </a:rPr>
               <a:t>.</a:t>
             </a:r>
             <a:r>
-              <a:rPr lang="en-US" sz="1200" dirty="0">
+              <a:rPr lang="en-US" sz="1100" dirty="0">
                 <a:solidFill>
                   <a:srgbClr val="001080"/>
                 </a:solidFill>
@@ -14285,7 +14293,7 @@
               <a:t>name</a:t>
             </a:r>
             <a:r>
-              <a:rPr lang="en-US" sz="1200" dirty="0">
+              <a:rPr lang="en-US" sz="1100" dirty="0">
                 <a:latin typeface="Consolas" panose="020B0609020204030204" pitchFamily="49" charset="0"/>
               </a:rPr>
               <a:t>;  </a:t>
@@ -14293,7 +14301,7 @@
           </a:p>
           <a:p>
             <a:r>
-              <a:rPr lang="en-US" sz="1200" dirty="0">
+              <a:rPr lang="en-US" sz="1100" dirty="0">
                 <a:latin typeface="Consolas" panose="020B0609020204030204" pitchFamily="49" charset="0"/>
               </a:rPr>
               <a:t>    }    </a:t>
@@ -14301,24 +14309,24 @@
           </a:p>
           <a:p>
             <a:r>
-              <a:rPr lang="en-US" sz="1200" dirty="0">
+              <a:rPr lang="en-US" sz="1100" dirty="0">
                 <a:latin typeface="Consolas" panose="020B0609020204030204" pitchFamily="49" charset="0"/>
               </a:rPr>
               <a:t/>
             </a:r>
             <a:br>
-              <a:rPr lang="en-US" sz="1200" dirty="0">
+              <a:rPr lang="en-US" sz="1100" dirty="0">
                 <a:latin typeface="Consolas" panose="020B0609020204030204" pitchFamily="49" charset="0"/>
               </a:rPr>
             </a:br>
             <a:r>
-              <a:rPr lang="en-US" sz="1200" dirty="0">
+              <a:rPr lang="en-US" sz="1100" dirty="0">
                 <a:latin typeface="Consolas" panose="020B0609020204030204" pitchFamily="49" charset="0"/>
               </a:rPr>
               <a:t>    </a:t>
             </a:r>
             <a:r>
-              <a:rPr lang="en-US" sz="1200" dirty="0">
+              <a:rPr lang="en-US" sz="1100" dirty="0">
                 <a:solidFill>
                   <a:srgbClr val="0000FF"/>
                 </a:solidFill>
@@ -14327,13 +14335,13 @@
               <a:t>public</a:t>
             </a:r>
             <a:r>
-              <a:rPr lang="en-US" sz="1200" dirty="0">
+              <a:rPr lang="en-US" sz="1100" dirty="0">
                 <a:latin typeface="Consolas" panose="020B0609020204030204" pitchFamily="49" charset="0"/>
               </a:rPr>
               <a:t> </a:t>
             </a:r>
             <a:r>
-              <a:rPr lang="en-US" sz="1200" b="1" dirty="0">
+              <a:rPr lang="en-US" sz="1100" b="1" dirty="0">
                 <a:solidFill>
                   <a:srgbClr val="FF0000"/>
                 </a:solidFill>
@@ -14342,13 +14350,13 @@
               <a:t>abstract</a:t>
             </a:r>
             <a:r>
-              <a:rPr lang="en-US" sz="1200" dirty="0">
+              <a:rPr lang="en-US" sz="1100" dirty="0">
                 <a:latin typeface="Consolas" panose="020B0609020204030204" pitchFamily="49" charset="0"/>
               </a:rPr>
               <a:t> </a:t>
             </a:r>
             <a:r>
-              <a:rPr lang="en-US" sz="1200" dirty="0">
+              <a:rPr lang="en-US" sz="1100" dirty="0">
                 <a:solidFill>
                   <a:srgbClr val="0000FF"/>
                 </a:solidFill>
@@ -14357,13 +14365,13 @@
               <a:t>void</a:t>
             </a:r>
             <a:r>
-              <a:rPr lang="en-US" sz="1200" dirty="0">
+              <a:rPr lang="en-US" sz="1100" dirty="0">
                 <a:latin typeface="Consolas" panose="020B0609020204030204" pitchFamily="49" charset="0"/>
               </a:rPr>
               <a:t> </a:t>
             </a:r>
             <a:r>
-              <a:rPr lang="en-US" sz="1200" dirty="0" err="1">
+              <a:rPr lang="en-US" sz="1100" dirty="0" err="1">
                 <a:solidFill>
                   <a:srgbClr val="795E26"/>
                 </a:solidFill>
@@ -14372,7 +14380,7 @@
               <a:t>MakeSound</a:t>
             </a:r>
             <a:r>
-              <a:rPr lang="en-US" sz="1200" dirty="0">
+              <a:rPr lang="en-US" sz="1100" dirty="0">
                 <a:latin typeface="Consolas" panose="020B0609020204030204" pitchFamily="49" charset="0"/>
               </a:rPr>
               <a:t>();</a:t>
@@ -14380,7 +14388,7 @@
           </a:p>
           <a:p>
             <a:r>
-              <a:rPr lang="en-US" sz="1200" dirty="0">
+              <a:rPr lang="en-US" sz="1100" dirty="0">
                 <a:latin typeface="Consolas" panose="020B0609020204030204" pitchFamily="49" charset="0"/>
               </a:rPr>
               <a:t>}</a:t>
@@ -14388,18 +14396,18 @@
           </a:p>
           <a:p>
             <a:r>
-              <a:rPr lang="en-US" sz="1200" dirty="0">
+              <a:rPr lang="en-US" sz="1100" dirty="0">
                 <a:latin typeface="Consolas" panose="020B0609020204030204" pitchFamily="49" charset="0"/>
               </a:rPr>
               <a:t/>
             </a:r>
             <a:br>
-              <a:rPr lang="en-US" sz="1200" dirty="0">
+              <a:rPr lang="en-US" sz="1100" dirty="0">
                 <a:latin typeface="Consolas" panose="020B0609020204030204" pitchFamily="49" charset="0"/>
               </a:rPr>
             </a:br>
             <a:r>
-              <a:rPr lang="en-US" sz="1200" dirty="0">
+              <a:rPr lang="en-US" sz="1100" dirty="0">
                 <a:solidFill>
                   <a:srgbClr val="0000FF"/>
                 </a:solidFill>
@@ -14408,13 +14416,13 @@
               <a:t>class</a:t>
             </a:r>
             <a:r>
-              <a:rPr lang="en-US" sz="1200" dirty="0">
+              <a:rPr lang="en-US" sz="1100" dirty="0">
                 <a:latin typeface="Consolas" panose="020B0609020204030204" pitchFamily="49" charset="0"/>
               </a:rPr>
               <a:t> </a:t>
             </a:r>
             <a:r>
-              <a:rPr lang="en-US" sz="1200" dirty="0">
+              <a:rPr lang="en-US" sz="1100" dirty="0">
                 <a:solidFill>
                   <a:srgbClr val="267F99"/>
                 </a:solidFill>
@@ -14423,13 +14431,13 @@
               <a:t>Dog</a:t>
             </a:r>
             <a:r>
-              <a:rPr lang="en-US" sz="1200" dirty="0">
+              <a:rPr lang="en-US" sz="1100" dirty="0">
                 <a:latin typeface="Consolas" panose="020B0609020204030204" pitchFamily="49" charset="0"/>
               </a:rPr>
               <a:t> : </a:t>
             </a:r>
             <a:r>
-              <a:rPr lang="en-US" sz="1200" dirty="0">
+              <a:rPr lang="en-US" sz="1100" dirty="0">
                 <a:solidFill>
                   <a:srgbClr val="267F99"/>
                 </a:solidFill>
@@ -14437,13 +14445,13 @@
               </a:rPr>
               <a:t>Animal</a:t>
             </a:r>
-            <a:endParaRPr lang="en-US" sz="1200" dirty="0">
+            <a:endParaRPr lang="en-US" sz="1100" dirty="0">
               <a:latin typeface="Consolas" panose="020B0609020204030204" pitchFamily="49" charset="0"/>
             </a:endParaRPr>
           </a:p>
           <a:p>
             <a:r>
-              <a:rPr lang="en-US" sz="1200" dirty="0">
+              <a:rPr lang="en-US" sz="1100" dirty="0">
                 <a:latin typeface="Consolas" panose="020B0609020204030204" pitchFamily="49" charset="0"/>
               </a:rPr>
               <a:t>{</a:t>
@@ -14451,13 +14459,13 @@
           </a:p>
           <a:p>
             <a:r>
-              <a:rPr lang="en-US" sz="1200" dirty="0">
+              <a:rPr lang="en-US" sz="1100" dirty="0">
                 <a:latin typeface="Consolas" panose="020B0609020204030204" pitchFamily="49" charset="0"/>
               </a:rPr>
               <a:t>    </a:t>
             </a:r>
             <a:r>
-              <a:rPr lang="en-US" sz="1200" dirty="0">
+              <a:rPr lang="en-US" sz="1100" dirty="0">
                 <a:solidFill>
                   <a:srgbClr val="0000FF"/>
                 </a:solidFill>
@@ -14466,13 +14474,13 @@
               <a:t>public</a:t>
             </a:r>
             <a:r>
-              <a:rPr lang="en-US" sz="1200" dirty="0">
+              <a:rPr lang="en-US" sz="1100" dirty="0">
                 <a:latin typeface="Consolas" panose="020B0609020204030204" pitchFamily="49" charset="0"/>
               </a:rPr>
               <a:t> </a:t>
             </a:r>
             <a:r>
-              <a:rPr lang="en-US" sz="1200" dirty="0">
+              <a:rPr lang="en-US" sz="1100" dirty="0">
                 <a:solidFill>
                   <a:srgbClr val="0000FF"/>
                 </a:solidFill>
@@ -14481,13 +14489,13 @@
               <a:t>override</a:t>
             </a:r>
             <a:r>
-              <a:rPr lang="en-US" sz="1200" dirty="0">
+              <a:rPr lang="en-US" sz="1100" dirty="0">
                 <a:latin typeface="Consolas" panose="020B0609020204030204" pitchFamily="49" charset="0"/>
               </a:rPr>
               <a:t> </a:t>
             </a:r>
             <a:r>
-              <a:rPr lang="en-US" sz="1200" dirty="0">
+              <a:rPr lang="en-US" sz="1100" dirty="0">
                 <a:solidFill>
                   <a:srgbClr val="0000FF"/>
                 </a:solidFill>
@@ -14496,13 +14504,13 @@
               <a:t>void</a:t>
             </a:r>
             <a:r>
-              <a:rPr lang="en-US" sz="1200" dirty="0">
+              <a:rPr lang="en-US" sz="1100" dirty="0">
                 <a:latin typeface="Consolas" panose="020B0609020204030204" pitchFamily="49" charset="0"/>
               </a:rPr>
               <a:t> </a:t>
             </a:r>
             <a:r>
-              <a:rPr lang="en-US" sz="1200" dirty="0" err="1">
+              <a:rPr lang="en-US" sz="1100" dirty="0" err="1">
                 <a:solidFill>
                   <a:srgbClr val="795E26"/>
                 </a:solidFill>
@@ -14511,7 +14519,7 @@
               <a:t>MakeSound</a:t>
             </a:r>
             <a:r>
-              <a:rPr lang="en-US" sz="1200" dirty="0">
+              <a:rPr lang="en-US" sz="1100" dirty="0">
                 <a:latin typeface="Consolas" panose="020B0609020204030204" pitchFamily="49" charset="0"/>
               </a:rPr>
               <a:t>()</a:t>
@@ -14519,7 +14527,7 @@
           </a:p>
           <a:p>
             <a:r>
-              <a:rPr lang="en-US" sz="1200" dirty="0">
+              <a:rPr lang="en-US" sz="1100" dirty="0">
                 <a:latin typeface="Consolas" panose="020B0609020204030204" pitchFamily="49" charset="0"/>
               </a:rPr>
               <a:t>    { </a:t>
@@ -14527,13 +14535,13 @@
           </a:p>
           <a:p>
             <a:r>
-              <a:rPr lang="en-US" sz="1200" dirty="0">
+              <a:rPr lang="en-US" sz="1100" dirty="0">
                 <a:latin typeface="Consolas" panose="020B0609020204030204" pitchFamily="49" charset="0"/>
               </a:rPr>
               <a:t>       </a:t>
             </a:r>
             <a:r>
-              <a:rPr lang="en-US" sz="1200" dirty="0" err="1">
+              <a:rPr lang="en-US" sz="1100" dirty="0" err="1">
                 <a:solidFill>
                   <a:srgbClr val="001080"/>
                 </a:solidFill>
@@ -14542,13 +14550,13 @@
               <a:t>Console</a:t>
             </a:r>
             <a:r>
-              <a:rPr lang="en-US" sz="1200" dirty="0" err="1">
+              <a:rPr lang="en-US" sz="1100" dirty="0" err="1">
                 <a:latin typeface="Consolas" panose="020B0609020204030204" pitchFamily="49" charset="0"/>
               </a:rPr>
               <a:t>.</a:t>
             </a:r>
             <a:r>
-              <a:rPr lang="en-US" sz="1200" dirty="0" err="1">
+              <a:rPr lang="en-US" sz="1100" dirty="0" err="1">
                 <a:solidFill>
                   <a:srgbClr val="795E26"/>
                 </a:solidFill>
@@ -14557,13 +14565,13 @@
               <a:t>WriteLine</a:t>
             </a:r>
             <a:r>
-              <a:rPr lang="en-US" sz="1200" dirty="0">
+              <a:rPr lang="en-US" sz="1100" dirty="0">
                 <a:latin typeface="Consolas" panose="020B0609020204030204" pitchFamily="49" charset="0"/>
               </a:rPr>
               <a:t>(</a:t>
             </a:r>
             <a:r>
-              <a:rPr lang="en-US" sz="1200" dirty="0">
+              <a:rPr lang="en-US" sz="1100" dirty="0">
                 <a:solidFill>
                   <a:srgbClr val="A31515"/>
                 </a:solidFill>
@@ -14572,7 +14580,7 @@
               <a:t>"Dog barks"</a:t>
             </a:r>
             <a:r>
-              <a:rPr lang="en-US" sz="1200" dirty="0">
+              <a:rPr lang="en-US" sz="1100" dirty="0">
                 <a:latin typeface="Consolas" panose="020B0609020204030204" pitchFamily="49" charset="0"/>
               </a:rPr>
               <a:t>); </a:t>
@@ -14580,7 +14588,7 @@
           </a:p>
           <a:p>
             <a:r>
-              <a:rPr lang="en-US" sz="1200" dirty="0">
+              <a:rPr lang="en-US" sz="1100" dirty="0">
                 <a:latin typeface="Consolas" panose="020B0609020204030204" pitchFamily="49" charset="0"/>
               </a:rPr>
               <a:t>    }</a:t>
@@ -14588,7 +14596,7 @@
           </a:p>
           <a:p>
             <a:r>
-              <a:rPr lang="en-US" sz="1200" dirty="0">
+              <a:rPr lang="en-US" sz="1100" dirty="0">
                 <a:latin typeface="Consolas" panose="020B0609020204030204" pitchFamily="49" charset="0"/>
               </a:rPr>
               <a:t>}</a:t>
@@ -14873,7 +14881,7 @@
         <p:spPr>
           <a:xfrm>
             <a:off x="4511337" y="1177787"/>
-            <a:ext cx="4632663" cy="2862322"/>
+            <a:ext cx="4632663" cy="2631490"/>
           </a:xfrm>
           <a:prstGeom prst="rect">
             <a:avLst/>
@@ -14886,7 +14894,7 @@
           <a:lstStyle/>
           <a:p>
             <a:r>
-              <a:rPr lang="en-US" sz="1200" dirty="0">
+              <a:rPr lang="en-US" sz="1100" dirty="0">
                 <a:solidFill>
                   <a:srgbClr val="0000FF"/>
                 </a:solidFill>
@@ -14895,13 +14903,13 @@
               <a:t>class</a:t>
             </a:r>
             <a:r>
-              <a:rPr lang="en-US" sz="1200" dirty="0">
+              <a:rPr lang="en-US" sz="1100" dirty="0">
                 <a:latin typeface="Consolas" panose="020B0609020204030204" pitchFamily="49" charset="0"/>
               </a:rPr>
               <a:t> </a:t>
             </a:r>
             <a:r>
-              <a:rPr lang="en-US" sz="1200" dirty="0">
+              <a:rPr lang="en-US" sz="1100" dirty="0">
                 <a:solidFill>
                   <a:srgbClr val="267F99"/>
                 </a:solidFill>
@@ -14909,13 +14917,13 @@
               </a:rPr>
               <a:t>Animal</a:t>
             </a:r>
-            <a:endParaRPr lang="en-US" sz="1200" dirty="0">
+            <a:endParaRPr lang="en-US" sz="1100" dirty="0">
               <a:latin typeface="Consolas" panose="020B0609020204030204" pitchFamily="49" charset="0"/>
             </a:endParaRPr>
           </a:p>
           <a:p>
             <a:r>
-              <a:rPr lang="en-US" sz="1200" dirty="0">
+              <a:rPr lang="en-US" sz="1100" dirty="0">
                 <a:latin typeface="Consolas" panose="020B0609020204030204" pitchFamily="49" charset="0"/>
               </a:rPr>
               <a:t>{</a:t>
@@ -14923,13 +14931,13 @@
           </a:p>
           <a:p>
             <a:r>
-              <a:rPr lang="en-US" sz="1200" dirty="0">
+              <a:rPr lang="en-US" sz="1100" dirty="0">
                 <a:latin typeface="Consolas" panose="020B0609020204030204" pitchFamily="49" charset="0"/>
               </a:rPr>
               <a:t>    </a:t>
             </a:r>
             <a:r>
-              <a:rPr lang="en-US" sz="1200" dirty="0">
+              <a:rPr lang="en-US" sz="1100" dirty="0">
                 <a:solidFill>
                   <a:srgbClr val="0000FF"/>
                 </a:solidFill>
@@ -14938,13 +14946,13 @@
               <a:t>public</a:t>
             </a:r>
             <a:r>
-              <a:rPr lang="en-US" sz="1200" dirty="0">
+              <a:rPr lang="en-US" sz="1100" dirty="0">
                 <a:latin typeface="Consolas" panose="020B0609020204030204" pitchFamily="49" charset="0"/>
               </a:rPr>
               <a:t> </a:t>
             </a:r>
             <a:r>
-              <a:rPr lang="en-US" sz="1200" dirty="0" smtClean="0">
+              <a:rPr lang="en-US" sz="1100" dirty="0" smtClean="0">
                 <a:solidFill>
                   <a:srgbClr val="0000FF"/>
                 </a:solidFill>
@@ -14953,13 +14961,13 @@
               <a:t>virtual</a:t>
             </a:r>
             <a:r>
-              <a:rPr lang="en-US" sz="1200" dirty="0" smtClean="0">
+              <a:rPr lang="en-US" sz="1100" dirty="0" smtClean="0">
                 <a:latin typeface="Consolas" panose="020B0609020204030204" pitchFamily="49" charset="0"/>
               </a:rPr>
               <a:t> </a:t>
             </a:r>
             <a:r>
-              <a:rPr lang="en-US" sz="1200" dirty="0">
+              <a:rPr lang="en-US" sz="1100" dirty="0">
                 <a:solidFill>
                   <a:srgbClr val="0000FF"/>
                 </a:solidFill>
@@ -14968,13 +14976,13 @@
               <a:t>void</a:t>
             </a:r>
             <a:r>
-              <a:rPr lang="en-US" sz="1200" dirty="0">
+              <a:rPr lang="en-US" sz="1100" dirty="0">
                 <a:latin typeface="Consolas" panose="020B0609020204030204" pitchFamily="49" charset="0"/>
               </a:rPr>
               <a:t> </a:t>
             </a:r>
             <a:r>
-              <a:rPr lang="en-US" sz="1200" dirty="0">
+              <a:rPr lang="en-US" sz="1100" dirty="0">
                 <a:solidFill>
                   <a:srgbClr val="795E26"/>
                 </a:solidFill>
@@ -14983,7 +14991,7 @@
               <a:t>Speak</a:t>
             </a:r>
             <a:r>
-              <a:rPr lang="en-US" sz="1200" dirty="0">
+              <a:rPr lang="en-US" sz="1100" dirty="0">
                 <a:latin typeface="Consolas" panose="020B0609020204030204" pitchFamily="49" charset="0"/>
               </a:rPr>
               <a:t>()</a:t>
@@ -14991,7 +14999,7 @@
           </a:p>
           <a:p>
             <a:r>
-              <a:rPr lang="en-US" sz="1200" dirty="0">
+              <a:rPr lang="en-US" sz="1100" dirty="0">
                 <a:latin typeface="Consolas" panose="020B0609020204030204" pitchFamily="49" charset="0"/>
               </a:rPr>
               <a:t>    {  </a:t>
@@ -14999,13 +15007,13 @@
           </a:p>
           <a:p>
             <a:r>
-              <a:rPr lang="en-US" sz="1200" dirty="0">
+              <a:rPr lang="en-US" sz="1100" dirty="0">
                 <a:latin typeface="Consolas" panose="020B0609020204030204" pitchFamily="49" charset="0"/>
               </a:rPr>
               <a:t>        </a:t>
             </a:r>
             <a:r>
-              <a:rPr lang="en-US" sz="1200" dirty="0" err="1">
+              <a:rPr lang="en-US" sz="1100" dirty="0" err="1">
                 <a:solidFill>
                   <a:srgbClr val="001080"/>
                 </a:solidFill>
@@ -15014,13 +15022,13 @@
               <a:t>Console</a:t>
             </a:r>
             <a:r>
-              <a:rPr lang="en-US" sz="1200" dirty="0" err="1">
+              <a:rPr lang="en-US" sz="1100" dirty="0" err="1">
                 <a:latin typeface="Consolas" panose="020B0609020204030204" pitchFamily="49" charset="0"/>
               </a:rPr>
               <a:t>.</a:t>
             </a:r>
             <a:r>
-              <a:rPr lang="en-US" sz="1200" dirty="0" err="1">
+              <a:rPr lang="en-US" sz="1100" dirty="0" err="1">
                 <a:solidFill>
                   <a:srgbClr val="795E26"/>
                 </a:solidFill>
@@ -15029,13 +15037,13 @@
               <a:t>WriteLine</a:t>
             </a:r>
             <a:r>
-              <a:rPr lang="en-US" sz="1200" dirty="0">
+              <a:rPr lang="en-US" sz="1100" dirty="0">
                 <a:latin typeface="Consolas" panose="020B0609020204030204" pitchFamily="49" charset="0"/>
               </a:rPr>
               <a:t>(</a:t>
             </a:r>
             <a:r>
-              <a:rPr lang="en-US" sz="1200" dirty="0">
+              <a:rPr lang="en-US" sz="1100" dirty="0">
                 <a:solidFill>
                   <a:srgbClr val="A31515"/>
                 </a:solidFill>
@@ -15044,7 +15052,7 @@
               <a:t>"Animal makes a sound"</a:t>
             </a:r>
             <a:r>
-              <a:rPr lang="en-US" sz="1200" dirty="0">
+              <a:rPr lang="en-US" sz="1100" dirty="0">
                 <a:latin typeface="Consolas" panose="020B0609020204030204" pitchFamily="49" charset="0"/>
               </a:rPr>
               <a:t>);  </a:t>
@@ -15052,7 +15060,7 @@
           </a:p>
           <a:p>
             <a:r>
-              <a:rPr lang="en-US" sz="1200" dirty="0">
+              <a:rPr lang="en-US" sz="1100" dirty="0">
                 <a:latin typeface="Consolas" panose="020B0609020204030204" pitchFamily="49" charset="0"/>
               </a:rPr>
               <a:t>    }</a:t>
@@ -15060,7 +15068,7 @@
           </a:p>
           <a:p>
             <a:r>
-              <a:rPr lang="en-US" sz="1200" dirty="0">
+              <a:rPr lang="en-US" sz="1100" dirty="0">
                 <a:latin typeface="Consolas" panose="020B0609020204030204" pitchFamily="49" charset="0"/>
               </a:rPr>
               <a:t>}</a:t>
@@ -15068,18 +15076,18 @@
           </a:p>
           <a:p>
             <a:r>
-              <a:rPr lang="en-US" sz="1200" dirty="0">
+              <a:rPr lang="en-US" sz="1100" dirty="0">
                 <a:latin typeface="Consolas" panose="020B0609020204030204" pitchFamily="49" charset="0"/>
               </a:rPr>
               <a:t/>
             </a:r>
             <a:br>
-              <a:rPr lang="en-US" sz="1200" dirty="0">
+              <a:rPr lang="en-US" sz="1100" dirty="0">
                 <a:latin typeface="Consolas" panose="020B0609020204030204" pitchFamily="49" charset="0"/>
               </a:rPr>
             </a:br>
             <a:r>
-              <a:rPr lang="en-US" sz="1200" dirty="0">
+              <a:rPr lang="en-US" sz="1100" dirty="0">
                 <a:solidFill>
                   <a:srgbClr val="0000FF"/>
                 </a:solidFill>
@@ -15088,13 +15096,13 @@
               <a:t>class</a:t>
             </a:r>
             <a:r>
-              <a:rPr lang="en-US" sz="1200" dirty="0">
+              <a:rPr lang="en-US" sz="1100" dirty="0">
                 <a:latin typeface="Consolas" panose="020B0609020204030204" pitchFamily="49" charset="0"/>
               </a:rPr>
               <a:t> </a:t>
             </a:r>
             <a:r>
-              <a:rPr lang="en-US" sz="1200" dirty="0">
+              <a:rPr lang="en-US" sz="1100" dirty="0">
                 <a:solidFill>
                   <a:srgbClr val="267F99"/>
                 </a:solidFill>
@@ -15103,13 +15111,13 @@
               <a:t>Dog</a:t>
             </a:r>
             <a:r>
-              <a:rPr lang="en-US" sz="1200" dirty="0">
+              <a:rPr lang="en-US" sz="1100" dirty="0">
                 <a:latin typeface="Consolas" panose="020B0609020204030204" pitchFamily="49" charset="0"/>
               </a:rPr>
               <a:t> : </a:t>
             </a:r>
             <a:r>
-              <a:rPr lang="en-US" sz="1200" dirty="0">
+              <a:rPr lang="en-US" sz="1100" dirty="0">
                 <a:solidFill>
                   <a:srgbClr val="267F99"/>
                 </a:solidFill>
@@ -15117,13 +15125,13 @@
               </a:rPr>
               <a:t>Animal</a:t>
             </a:r>
-            <a:endParaRPr lang="en-US" sz="1200" dirty="0">
+            <a:endParaRPr lang="en-US" sz="1100" dirty="0">
               <a:latin typeface="Consolas" panose="020B0609020204030204" pitchFamily="49" charset="0"/>
             </a:endParaRPr>
           </a:p>
           <a:p>
             <a:r>
-              <a:rPr lang="en-US" sz="1200" dirty="0">
+              <a:rPr lang="en-US" sz="1100" dirty="0">
                 <a:latin typeface="Consolas" panose="020B0609020204030204" pitchFamily="49" charset="0"/>
               </a:rPr>
               <a:t>{</a:t>
@@ -15131,13 +15139,13 @@
           </a:p>
           <a:p>
             <a:r>
-              <a:rPr lang="en-US" sz="1200" dirty="0">
+              <a:rPr lang="en-US" sz="1100" dirty="0">
                 <a:latin typeface="Consolas" panose="020B0609020204030204" pitchFamily="49" charset="0"/>
               </a:rPr>
               <a:t>    </a:t>
             </a:r>
             <a:r>
-              <a:rPr lang="en-US" sz="1200" dirty="0">
+              <a:rPr lang="en-US" sz="1100" dirty="0">
                 <a:solidFill>
                   <a:srgbClr val="0000FF"/>
                 </a:solidFill>
@@ -15146,13 +15154,13 @@
               <a:t>public</a:t>
             </a:r>
             <a:r>
-              <a:rPr lang="en-US" sz="1200" dirty="0">
+              <a:rPr lang="en-US" sz="1100" dirty="0">
                 <a:latin typeface="Consolas" panose="020B0609020204030204" pitchFamily="49" charset="0"/>
               </a:rPr>
               <a:t> </a:t>
             </a:r>
             <a:r>
-              <a:rPr lang="en-US" sz="1200" b="1" dirty="0">
+              <a:rPr lang="en-US" sz="1100" b="1" dirty="0">
                 <a:solidFill>
                   <a:srgbClr val="FF0000"/>
                 </a:solidFill>
@@ -15161,13 +15169,13 @@
               <a:t>override</a:t>
             </a:r>
             <a:r>
-              <a:rPr lang="en-US" sz="1200" dirty="0">
+              <a:rPr lang="en-US" sz="1100" dirty="0">
                 <a:latin typeface="Consolas" panose="020B0609020204030204" pitchFamily="49" charset="0"/>
               </a:rPr>
               <a:t> </a:t>
             </a:r>
             <a:r>
-              <a:rPr lang="en-US" sz="1200" dirty="0">
+              <a:rPr lang="en-US" sz="1100" dirty="0">
                 <a:solidFill>
                   <a:srgbClr val="0000FF"/>
                 </a:solidFill>
@@ -15176,13 +15184,13 @@
               <a:t>void</a:t>
             </a:r>
             <a:r>
-              <a:rPr lang="en-US" sz="1200" dirty="0">
+              <a:rPr lang="en-US" sz="1100" dirty="0">
                 <a:latin typeface="Consolas" panose="020B0609020204030204" pitchFamily="49" charset="0"/>
               </a:rPr>
               <a:t> </a:t>
             </a:r>
             <a:r>
-              <a:rPr lang="en-US" sz="1200" dirty="0">
+              <a:rPr lang="en-US" sz="1100" dirty="0">
                 <a:solidFill>
                   <a:srgbClr val="795E26"/>
                 </a:solidFill>
@@ -15191,7 +15199,7 @@
               <a:t>Speak</a:t>
             </a:r>
             <a:r>
-              <a:rPr lang="en-US" sz="1200" dirty="0">
+              <a:rPr lang="en-US" sz="1100" dirty="0">
                 <a:latin typeface="Consolas" panose="020B0609020204030204" pitchFamily="49" charset="0"/>
               </a:rPr>
               <a:t>()</a:t>
@@ -15199,7 +15207,7 @@
           </a:p>
           <a:p>
             <a:r>
-              <a:rPr lang="en-US" sz="1200" dirty="0">
+              <a:rPr lang="en-US" sz="1100" dirty="0">
                 <a:latin typeface="Consolas" panose="020B0609020204030204" pitchFamily="49" charset="0"/>
               </a:rPr>
               <a:t>    {  </a:t>
@@ -15207,13 +15215,13 @@
           </a:p>
           <a:p>
             <a:r>
-              <a:rPr lang="en-US" sz="1200" dirty="0">
+              <a:rPr lang="en-US" sz="1100" dirty="0">
                 <a:latin typeface="Consolas" panose="020B0609020204030204" pitchFamily="49" charset="0"/>
               </a:rPr>
               <a:t>        </a:t>
             </a:r>
             <a:r>
-              <a:rPr lang="en-US" sz="1200" dirty="0" err="1">
+              <a:rPr lang="en-US" sz="1100" dirty="0" err="1">
                 <a:solidFill>
                   <a:srgbClr val="001080"/>
                 </a:solidFill>
@@ -15222,13 +15230,13 @@
               <a:t>Console</a:t>
             </a:r>
             <a:r>
-              <a:rPr lang="en-US" sz="1200" dirty="0" err="1">
+              <a:rPr lang="en-US" sz="1100" dirty="0" err="1">
                 <a:latin typeface="Consolas" panose="020B0609020204030204" pitchFamily="49" charset="0"/>
               </a:rPr>
               <a:t>.</a:t>
             </a:r>
             <a:r>
-              <a:rPr lang="en-US" sz="1200" dirty="0" err="1">
+              <a:rPr lang="en-US" sz="1100" dirty="0" err="1">
                 <a:solidFill>
                   <a:srgbClr val="795E26"/>
                 </a:solidFill>
@@ -15237,13 +15245,13 @@
               <a:t>WriteLine</a:t>
             </a:r>
             <a:r>
-              <a:rPr lang="en-US" sz="1200" dirty="0">
+              <a:rPr lang="en-US" sz="1100" dirty="0">
                 <a:latin typeface="Consolas" panose="020B0609020204030204" pitchFamily="49" charset="0"/>
               </a:rPr>
               <a:t>(</a:t>
             </a:r>
             <a:r>
-              <a:rPr lang="en-US" sz="1200" dirty="0">
+              <a:rPr lang="en-US" sz="1100" dirty="0">
                 <a:solidFill>
                   <a:srgbClr val="A31515"/>
                 </a:solidFill>
@@ -15252,7 +15260,7 @@
               <a:t>"Dog barks"</a:t>
             </a:r>
             <a:r>
-              <a:rPr lang="en-US" sz="1200" dirty="0">
+              <a:rPr lang="en-US" sz="1100" dirty="0">
                 <a:latin typeface="Consolas" panose="020B0609020204030204" pitchFamily="49" charset="0"/>
               </a:rPr>
               <a:t>);  </a:t>
@@ -15260,7 +15268,7 @@
           </a:p>
           <a:p>
             <a:r>
-              <a:rPr lang="en-US" sz="1200" dirty="0">
+              <a:rPr lang="en-US" sz="1100" dirty="0">
                 <a:latin typeface="Consolas" panose="020B0609020204030204" pitchFamily="49" charset="0"/>
               </a:rPr>
               <a:t>    }</a:t>
@@ -15268,7 +15276,7 @@
           </a:p>
           <a:p>
             <a:r>
-              <a:rPr lang="en-US" sz="1200" dirty="0">
+              <a:rPr lang="en-US" sz="1100" dirty="0">
                 <a:latin typeface="Consolas" panose="020B0609020204030204" pitchFamily="49" charset="0"/>
               </a:rPr>
               <a:t>}</a:t>
@@ -17453,7 +17461,7 @@
         <p:spPr>
           <a:xfrm>
             <a:off x="512993" y="1116836"/>
-            <a:ext cx="4138787" cy="2646878"/>
+            <a:ext cx="4138787" cy="2539157"/>
           </a:xfrm>
           <a:prstGeom prst="rect">
             <a:avLst/>
@@ -17480,7 +17488,7 @@
           </a:p>
           <a:p>
             <a:r>
-              <a:rPr lang="en-US" sz="1200" dirty="0">
+              <a:rPr lang="en-US" sz="1100" dirty="0">
                 <a:solidFill>
                   <a:srgbClr val="001080"/>
                 </a:solidFill>
@@ -17489,13 +17497,13 @@
               <a:t>List</a:t>
             </a:r>
             <a:r>
-              <a:rPr lang="en-US" sz="1200" dirty="0">
+              <a:rPr lang="en-US" sz="1100" dirty="0">
                 <a:latin typeface="Consolas" panose="020B0609020204030204" pitchFamily="49" charset="0"/>
               </a:rPr>
               <a:t>&lt;</a:t>
             </a:r>
             <a:r>
-              <a:rPr lang="en-US" sz="1200" dirty="0">
+              <a:rPr lang="en-US" sz="1100" dirty="0">
                 <a:solidFill>
                   <a:srgbClr val="0000FF"/>
                 </a:solidFill>
@@ -17504,13 +17512,13 @@
               <a:t>string</a:t>
             </a:r>
             <a:r>
-              <a:rPr lang="en-US" sz="1200" dirty="0">
+              <a:rPr lang="en-US" sz="1100" dirty="0">
                 <a:latin typeface="Consolas" panose="020B0609020204030204" pitchFamily="49" charset="0"/>
               </a:rPr>
               <a:t>&gt; </a:t>
             </a:r>
             <a:r>
-              <a:rPr lang="en-US" sz="1200" dirty="0">
+              <a:rPr lang="en-US" sz="1100" dirty="0">
                 <a:solidFill>
                   <a:srgbClr val="001080"/>
                 </a:solidFill>
@@ -17519,13 +17527,13 @@
               <a:t>strings</a:t>
             </a:r>
             <a:r>
-              <a:rPr lang="en-US" sz="1200" dirty="0">
+              <a:rPr lang="en-US" sz="1100" dirty="0">
                 <a:latin typeface="Consolas" panose="020B0609020204030204" pitchFamily="49" charset="0"/>
               </a:rPr>
               <a:t> = </a:t>
             </a:r>
             <a:r>
-              <a:rPr lang="en-US" sz="1200" dirty="0">
+              <a:rPr lang="en-US" sz="1100" dirty="0">
                 <a:solidFill>
                   <a:srgbClr val="0000FF"/>
                 </a:solidFill>
@@ -17534,13 +17542,13 @@
               <a:t>new</a:t>
             </a:r>
             <a:r>
-              <a:rPr lang="en-US" sz="1200" dirty="0">
+              <a:rPr lang="en-US" sz="1100" dirty="0">
                 <a:latin typeface="Consolas" panose="020B0609020204030204" pitchFamily="49" charset="0"/>
               </a:rPr>
               <a:t> </a:t>
             </a:r>
             <a:r>
-              <a:rPr lang="en-US" sz="1200" dirty="0">
+              <a:rPr lang="en-US" sz="1100" dirty="0">
                 <a:solidFill>
                   <a:srgbClr val="001080"/>
                 </a:solidFill>
@@ -17549,13 +17557,13 @@
               <a:t>List</a:t>
             </a:r>
             <a:r>
-              <a:rPr lang="en-US" sz="1200" dirty="0">
+              <a:rPr lang="en-US" sz="1100" dirty="0">
                 <a:latin typeface="Consolas" panose="020B0609020204030204" pitchFamily="49" charset="0"/>
               </a:rPr>
               <a:t>&lt;</a:t>
             </a:r>
             <a:r>
-              <a:rPr lang="en-US" sz="1200" dirty="0">
+              <a:rPr lang="en-US" sz="1100" dirty="0">
                 <a:solidFill>
                   <a:srgbClr val="0000FF"/>
                 </a:solidFill>
@@ -17564,7 +17572,7 @@
               <a:t>string</a:t>
             </a:r>
             <a:r>
-              <a:rPr lang="en-US" sz="1200" dirty="0">
+              <a:rPr lang="en-US" sz="1100" dirty="0">
                 <a:latin typeface="Consolas" panose="020B0609020204030204" pitchFamily="49" charset="0"/>
               </a:rPr>
               <a:t>&gt;();</a:t>
@@ -17572,18 +17580,18 @@
           </a:p>
           <a:p>
             <a:r>
-              <a:rPr lang="en-US" sz="1200" dirty="0">
+              <a:rPr lang="en-US" sz="1100" dirty="0">
                 <a:latin typeface="Consolas" panose="020B0609020204030204" pitchFamily="49" charset="0"/>
               </a:rPr>
               <a:t/>
             </a:r>
             <a:br>
-              <a:rPr lang="en-US" sz="1200" dirty="0">
+              <a:rPr lang="en-US" sz="1100" dirty="0">
                 <a:latin typeface="Consolas" panose="020B0609020204030204" pitchFamily="49" charset="0"/>
               </a:rPr>
             </a:br>
             <a:r>
-              <a:rPr lang="en-US" sz="1200" dirty="0">
+              <a:rPr lang="en-US" sz="1100" dirty="0">
                 <a:solidFill>
                   <a:srgbClr val="001080"/>
                 </a:solidFill>
@@ -17592,13 +17600,13 @@
               <a:t>List</a:t>
             </a:r>
             <a:r>
-              <a:rPr lang="en-US" sz="1200" dirty="0">
+              <a:rPr lang="en-US" sz="1100" dirty="0">
                 <a:latin typeface="Consolas" panose="020B0609020204030204" pitchFamily="49" charset="0"/>
               </a:rPr>
               <a:t>&lt;</a:t>
             </a:r>
             <a:r>
-              <a:rPr lang="en-US" sz="1200" dirty="0" err="1">
+              <a:rPr lang="en-US" sz="1100" dirty="0" err="1">
                 <a:solidFill>
                   <a:srgbClr val="0000FF"/>
                 </a:solidFill>
@@ -17607,13 +17615,13 @@
               <a:t>int</a:t>
             </a:r>
             <a:r>
-              <a:rPr lang="en-US" sz="1200" dirty="0">
+              <a:rPr lang="en-US" sz="1100" dirty="0">
                 <a:latin typeface="Consolas" panose="020B0609020204030204" pitchFamily="49" charset="0"/>
               </a:rPr>
               <a:t>&gt; </a:t>
             </a:r>
             <a:r>
-              <a:rPr lang="en-US" sz="1200" dirty="0" err="1">
+              <a:rPr lang="en-US" sz="1100" dirty="0" err="1">
                 <a:solidFill>
                   <a:srgbClr val="001080"/>
                 </a:solidFill>
@@ -17622,13 +17630,13 @@
               <a:t>ints</a:t>
             </a:r>
             <a:r>
-              <a:rPr lang="en-US" sz="1200" dirty="0">
+              <a:rPr lang="en-US" sz="1100" dirty="0">
                 <a:latin typeface="Consolas" panose="020B0609020204030204" pitchFamily="49" charset="0"/>
               </a:rPr>
               <a:t> = </a:t>
             </a:r>
             <a:r>
-              <a:rPr lang="en-US" sz="1200" dirty="0">
+              <a:rPr lang="en-US" sz="1100" dirty="0">
                 <a:solidFill>
                   <a:srgbClr val="0000FF"/>
                 </a:solidFill>
@@ -17637,13 +17645,13 @@
               <a:t>new</a:t>
             </a:r>
             <a:r>
-              <a:rPr lang="en-US" sz="1200" dirty="0">
+              <a:rPr lang="en-US" sz="1100" dirty="0">
                 <a:latin typeface="Consolas" panose="020B0609020204030204" pitchFamily="49" charset="0"/>
               </a:rPr>
               <a:t> </a:t>
             </a:r>
             <a:r>
-              <a:rPr lang="en-US" sz="1200" dirty="0">
+              <a:rPr lang="en-US" sz="1100" dirty="0">
                 <a:solidFill>
                   <a:srgbClr val="001080"/>
                 </a:solidFill>
@@ -17652,13 +17660,13 @@
               <a:t>List</a:t>
             </a:r>
             <a:r>
-              <a:rPr lang="en-US" sz="1200" dirty="0">
+              <a:rPr lang="en-US" sz="1100" dirty="0">
                 <a:latin typeface="Consolas" panose="020B0609020204030204" pitchFamily="49" charset="0"/>
               </a:rPr>
               <a:t>&lt;</a:t>
             </a:r>
             <a:r>
-              <a:rPr lang="en-US" sz="1200" dirty="0" err="1">
+              <a:rPr lang="en-US" sz="1100" dirty="0" err="1">
                 <a:solidFill>
                   <a:srgbClr val="0000FF"/>
                 </a:solidFill>
@@ -17667,7 +17675,7 @@
               <a:t>int</a:t>
             </a:r>
             <a:r>
-              <a:rPr lang="en-US" sz="1200" dirty="0">
+              <a:rPr lang="en-US" sz="1100" dirty="0">
                 <a:latin typeface="Consolas" panose="020B0609020204030204" pitchFamily="49" charset="0"/>
               </a:rPr>
               <a:t>&gt;();</a:t>
@@ -18698,7 +18706,7 @@
           </a:p>
           <a:p>
             <a:r>
-              <a:rPr lang="en-US" dirty="0" err="1">
+              <a:rPr lang="en-US" sz="1100" dirty="0" err="1">
                 <a:solidFill>
                   <a:srgbClr val="AF00DB"/>
                 </a:solidFill>
@@ -18707,13 +18715,13 @@
               <a:t>foreach</a:t>
             </a:r>
             <a:r>
-              <a:rPr lang="en-US" dirty="0">
+              <a:rPr lang="en-US" sz="1100" dirty="0">
                 <a:latin typeface="Consolas" panose="020B0609020204030204" pitchFamily="49" charset="0"/>
               </a:rPr>
               <a:t> (</a:t>
             </a:r>
             <a:r>
-              <a:rPr lang="en-US" dirty="0">
+              <a:rPr lang="en-US" sz="1100" dirty="0">
                 <a:solidFill>
                   <a:srgbClr val="267F99"/>
                 </a:solidFill>
@@ -18722,13 +18730,13 @@
               <a:t>Shape</a:t>
             </a:r>
             <a:r>
-              <a:rPr lang="en-US" dirty="0">
+              <a:rPr lang="en-US" sz="1100" dirty="0">
                 <a:latin typeface="Consolas" panose="020B0609020204030204" pitchFamily="49" charset="0"/>
               </a:rPr>
               <a:t> </a:t>
             </a:r>
             <a:r>
-              <a:rPr lang="en-US" dirty="0" err="1">
+              <a:rPr lang="en-US" sz="1100" dirty="0" err="1">
                 <a:solidFill>
                   <a:srgbClr val="001080"/>
                 </a:solidFill>
@@ -18737,13 +18745,13 @@
               <a:t>shape</a:t>
             </a:r>
             <a:r>
-              <a:rPr lang="en-US" dirty="0">
+              <a:rPr lang="en-US" sz="1100" dirty="0">
                 <a:latin typeface="Consolas" panose="020B0609020204030204" pitchFamily="49" charset="0"/>
               </a:rPr>
               <a:t> </a:t>
             </a:r>
             <a:r>
-              <a:rPr lang="en-US" dirty="0">
+              <a:rPr lang="en-US" sz="1100" dirty="0">
                 <a:solidFill>
                   <a:srgbClr val="AF00DB"/>
                 </a:solidFill>
@@ -18752,13 +18760,13 @@
               <a:t>in</a:t>
             </a:r>
             <a:r>
-              <a:rPr lang="en-US" dirty="0">
+              <a:rPr lang="en-US" sz="1100" dirty="0">
                 <a:latin typeface="Consolas" panose="020B0609020204030204" pitchFamily="49" charset="0"/>
               </a:rPr>
               <a:t> </a:t>
             </a:r>
             <a:r>
-              <a:rPr lang="en-US" dirty="0">
+              <a:rPr lang="en-US" sz="1100" dirty="0">
                 <a:solidFill>
                   <a:srgbClr val="001080"/>
                 </a:solidFill>
@@ -18767,7 +18775,7 @@
               <a:t>shapes</a:t>
             </a:r>
             <a:r>
-              <a:rPr lang="en-US" dirty="0">
+              <a:rPr lang="en-US" sz="1100" dirty="0">
                 <a:latin typeface="Consolas" panose="020B0609020204030204" pitchFamily="49" charset="0"/>
               </a:rPr>
               <a:t>)</a:t>
@@ -18775,13 +18783,13 @@
           </a:p>
           <a:p>
             <a:r>
-              <a:rPr lang="en-US" dirty="0">
+              <a:rPr lang="en-US" sz="1100" dirty="0">
                 <a:latin typeface="Consolas" panose="020B0609020204030204" pitchFamily="49" charset="0"/>
               </a:rPr>
               <a:t>    </a:t>
             </a:r>
             <a:r>
-              <a:rPr lang="en-US" dirty="0" err="1">
+              <a:rPr lang="en-US" sz="1100" dirty="0" err="1">
                 <a:solidFill>
                   <a:srgbClr val="001080"/>
                 </a:solidFill>
@@ -18790,13 +18798,13 @@
               <a:t>shape</a:t>
             </a:r>
             <a:r>
-              <a:rPr lang="en-US" dirty="0" err="1">
+              <a:rPr lang="en-US" sz="1100" dirty="0" err="1">
                 <a:latin typeface="Consolas" panose="020B0609020204030204" pitchFamily="49" charset="0"/>
               </a:rPr>
               <a:t>.</a:t>
             </a:r>
             <a:r>
-              <a:rPr lang="en-US" dirty="0" err="1">
+              <a:rPr lang="en-US" sz="1100" dirty="0" err="1">
                 <a:solidFill>
                   <a:srgbClr val="795E26"/>
                 </a:solidFill>
@@ -18805,13 +18813,13 @@
               <a:t>Draw</a:t>
             </a:r>
             <a:r>
-              <a:rPr lang="en-US" dirty="0">
+              <a:rPr lang="en-US" sz="1100" dirty="0">
                 <a:latin typeface="Consolas" panose="020B0609020204030204" pitchFamily="49" charset="0"/>
               </a:rPr>
               <a:t>(</a:t>
             </a:r>
             <a:r>
-              <a:rPr lang="en-US" dirty="0">
+              <a:rPr lang="en-US" sz="1100" dirty="0">
                 <a:solidFill>
                   <a:srgbClr val="098658"/>
                 </a:solidFill>
@@ -18820,13 +18828,13 @@
               <a:t>0</a:t>
             </a:r>
             <a:r>
-              <a:rPr lang="en-US" dirty="0">
+              <a:rPr lang="en-US" sz="1100" dirty="0">
                 <a:latin typeface="Consolas" panose="020B0609020204030204" pitchFamily="49" charset="0"/>
               </a:rPr>
               <a:t>, </a:t>
             </a:r>
             <a:r>
-              <a:rPr lang="en-US" dirty="0">
+              <a:rPr lang="en-US" sz="1100" dirty="0">
                 <a:solidFill>
                   <a:srgbClr val="098658"/>
                 </a:solidFill>
@@ -18835,7 +18843,7 @@
               <a:t>0</a:t>
             </a:r>
             <a:r>
-              <a:rPr lang="en-US" dirty="0">
+              <a:rPr lang="en-US" sz="1100" dirty="0">
                 <a:latin typeface="Consolas" panose="020B0609020204030204" pitchFamily="49" charset="0"/>
               </a:rPr>
               <a:t>);</a:t>
@@ -18865,7 +18873,7 @@
 </file>
 
 <file path=ppt/slides/slide25.xml><?xml version="1.0" encoding="utf-8"?>
-<p:sld xmlns:a="http://schemas.openxmlformats.org/drawingml/2006/main" xmlns:r="http://schemas.openxmlformats.org/officeDocument/2006/relationships" xmlns:p="http://schemas.openxmlformats.org/presentationml/2006/main">
+<p:sld xmlns:a="http://schemas.openxmlformats.org/drawingml/2006/main" xmlns:r="http://schemas.openxmlformats.org/officeDocument/2006/relationships" xmlns:p="http://schemas.openxmlformats.org/presentationml/2006/main" show="0">
   <p:cSld>
     <p:spTree>
       <p:nvGrpSpPr>
@@ -19011,14 +19019,7 @@
   <p:clrMapOvr>
     <a:masterClrMapping/>
   </p:clrMapOvr>
-  <mc:AlternateContent xmlns:mc="http://schemas.openxmlformats.org/markup-compatibility/2006">
-    <mc:Choice xmlns="" xmlns:p14="http://schemas.microsoft.com/office/powerpoint/2010/main" Requires="p14">
-      <p:transition spd="slow" p14:dur="2000"/>
-    </mc:Choice>
-    <mc:Fallback>
-      <p:transition spd="slow"/>
-    </mc:Fallback>
-  </mc:AlternateContent>
+  <p:transition spd="slow"/>
   <p:timing>
     <p:tnLst>
       <p:par>
@@ -25221,11 +25222,7 @@
             </a:r>
             <a:r>
               <a:rPr lang="ru-RU" b="1" dirty="0" smtClean="0"/>
-              <a:t>скрывая детали </a:t>
-            </a:r>
-            <a:r>
-              <a:rPr lang="ru-RU" b="1" dirty="0" smtClean="0"/>
-              <a:t>реализации</a:t>
+              <a:t>скрывая детали реализации</a:t>
             </a:r>
             <a:r>
               <a:rPr lang="ru-RU" dirty="0" smtClean="0"/>
@@ -25258,8 +25255,8 @@
         </p:nvSpPr>
         <p:spPr>
           <a:xfrm>
-            <a:off x="4666765" y="2933068"/>
-            <a:ext cx="3126757" cy="954107"/>
+            <a:off x="4672902" y="2890110"/>
+            <a:ext cx="3513740" cy="1384995"/>
           </a:xfrm>
           <a:prstGeom prst="rect">
             <a:avLst/>
@@ -25297,6 +25294,21 @@
                 <a:cs typeface="Calibri" pitchFamily="34" charset="0"/>
               </a:rPr>
               <a:t>Пример: «Небесные тела». Кто-то представляет звезду, кто-то планету, кто-то метеорит, кто-то комету. И все варианты подходят.</a:t>
+            </a:r>
+          </a:p>
+          <a:p>
+            <a:r>
+              <a:rPr lang="ru-RU" i="1" dirty="0" smtClean="0">
+                <a:solidFill>
+                  <a:schemeClr val="accent2">
+                    <a:lumMod val="50000"/>
+                    <a:lumOff val="50000"/>
+                  </a:schemeClr>
+                </a:solidFill>
+                <a:latin typeface="Calibri" pitchFamily="34" charset="0"/>
+                <a:cs typeface="Calibri" pitchFamily="34" charset="0"/>
+              </a:rPr>
+              <a:t>Что между ними общего – все они находятся в космическом пространстве.</a:t>
             </a:r>
             <a:endParaRPr lang="ru-RU" i="1" dirty="0">
               <a:solidFill>

</xml_diff>